<commit_message>
some other style fixe
</commit_message>
<xml_diff>
--- a/com/bailandoo/bailandoo.pptx
+++ b/com/bailandoo/bailandoo.pptx
@@ -3,9 +3,11 @@
 <p:presentation xmlns:a="http://schemas.openxmlformats.org/drawingml/2006/main" xmlns:r="http://schemas.openxmlformats.org/officeDocument/2006/relationships" xmlns:p="http://schemas.openxmlformats.org/presentationml/2006/main" saveSubsetFonts="1">
   <p:sldMasterIdLst>
     <p:sldMasterId id="2147483648" r:id="rId1"/>
+    <p:sldMasterId id="2147483660" r:id="rId2"/>
   </p:sldMasterIdLst>
   <p:sldIdLst>
-    <p:sldId id="256" r:id="rId2"/>
+    <p:sldId id="256" r:id="rId3"/>
+    <p:sldId id="257" r:id="rId4"/>
   </p:sldIdLst>
   <p:sldSz cx="12192000" cy="6858000"/>
   <p:notesSz cx="6858000" cy="9144000"/>
@@ -243,7 +245,7 @@
           <a:p>
             <a:fld id="{BE9E4639-3C3E-4B8B-BDFD-ECAC4CBC4975}" type="datetimeFigureOut">
               <a:rPr lang="it-IT" smtClean="0"/>
-              <a:t>29/11/2015</a:t>
+              <a:t>01/12/2015</a:t>
             </a:fld>
             <a:endParaRPr lang="it-IT"/>
           </a:p>
@@ -413,7 +415,7 @@
           <a:p>
             <a:fld id="{BE9E4639-3C3E-4B8B-BDFD-ECAC4CBC4975}" type="datetimeFigureOut">
               <a:rPr lang="it-IT" smtClean="0"/>
-              <a:t>29/11/2015</a:t>
+              <a:t>01/12/2015</a:t>
             </a:fld>
             <a:endParaRPr lang="it-IT"/>
           </a:p>
@@ -593,7 +595,7 @@
           <a:p>
             <a:fld id="{BE9E4639-3C3E-4B8B-BDFD-ECAC4CBC4975}" type="datetimeFigureOut">
               <a:rPr lang="it-IT" smtClean="0"/>
-              <a:t>29/11/2015</a:t>
+              <a:t>01/12/2015</a:t>
             </a:fld>
             <a:endParaRPr lang="it-IT"/>
           </a:p>
@@ -645,6 +647,1959 @@
     <p:extLst>
       <p:ext uri="{BB962C8B-B14F-4D97-AF65-F5344CB8AC3E}">
         <p14:creationId xmlns:p14="http://schemas.microsoft.com/office/powerpoint/2010/main" val="2409022104"/>
+      </p:ext>
+    </p:extLst>
+  </p:cSld>
+  <p:clrMapOvr>
+    <a:masterClrMapping/>
+  </p:clrMapOvr>
+</p:sldLayout>
+</file>
+
+<file path=ppt/slideLayouts/slideLayout12.xml><?xml version="1.0" encoding="utf-8"?>
+<p:sldLayout xmlns:a="http://schemas.openxmlformats.org/drawingml/2006/main" xmlns:r="http://schemas.openxmlformats.org/officeDocument/2006/relationships" xmlns:p="http://schemas.openxmlformats.org/presentationml/2006/main" type="title" preserve="1">
+  <p:cSld name="Title Slide">
+    <p:spTree>
+      <p:nvGrpSpPr>
+        <p:cNvPr id="1" name=""/>
+        <p:cNvGrpSpPr/>
+        <p:nvPr/>
+      </p:nvGrpSpPr>
+      <p:grpSpPr>
+        <a:xfrm>
+          <a:off x="0" y="0"/>
+          <a:ext cx="0" cy="0"/>
+          <a:chOff x="0" y="0"/>
+          <a:chExt cx="0" cy="0"/>
+        </a:xfrm>
+      </p:grpSpPr>
+      <p:sp>
+        <p:nvSpPr>
+          <p:cNvPr id="2" name="Title 1"/>
+          <p:cNvSpPr>
+            <a:spLocks noGrp="1"/>
+          </p:cNvSpPr>
+          <p:nvPr>
+            <p:ph type="ctrTitle"/>
+          </p:nvPr>
+        </p:nvSpPr>
+        <p:spPr>
+          <a:xfrm>
+            <a:off x="1524000" y="1122363"/>
+            <a:ext cx="9144000" cy="2387600"/>
+          </a:xfrm>
+        </p:spPr>
+        <p:txBody>
+          <a:bodyPr anchor="b"/>
+          <a:lstStyle>
+            <a:lvl1pPr algn="ctr">
+              <a:defRPr sz="6000"/>
+            </a:lvl1pPr>
+          </a:lstStyle>
+          <a:p>
+            <a:r>
+              <a:rPr lang="en-US" smtClean="0"/>
+              <a:t>Click to edit Master title style</a:t>
+            </a:r>
+            <a:endParaRPr lang="it-IT"/>
+          </a:p>
+        </p:txBody>
+      </p:sp>
+      <p:sp>
+        <p:nvSpPr>
+          <p:cNvPr id="3" name="Subtitle 2"/>
+          <p:cNvSpPr>
+            <a:spLocks noGrp="1"/>
+          </p:cNvSpPr>
+          <p:nvPr>
+            <p:ph type="subTitle" idx="1"/>
+          </p:nvPr>
+        </p:nvSpPr>
+        <p:spPr>
+          <a:xfrm>
+            <a:off x="1524000" y="3602038"/>
+            <a:ext cx="9144000" cy="1655762"/>
+          </a:xfrm>
+        </p:spPr>
+        <p:txBody>
+          <a:bodyPr/>
+          <a:lstStyle>
+            <a:lvl1pPr marL="0" indent="0" algn="ctr">
+              <a:buNone/>
+              <a:defRPr sz="2400"/>
+            </a:lvl1pPr>
+            <a:lvl2pPr marL="457200" indent="0" algn="ctr">
+              <a:buNone/>
+              <a:defRPr sz="2000"/>
+            </a:lvl2pPr>
+            <a:lvl3pPr marL="914400" indent="0" algn="ctr">
+              <a:buNone/>
+              <a:defRPr sz="1800"/>
+            </a:lvl3pPr>
+            <a:lvl4pPr marL="1371600" indent="0" algn="ctr">
+              <a:buNone/>
+              <a:defRPr sz="1600"/>
+            </a:lvl4pPr>
+            <a:lvl5pPr marL="1828800" indent="0" algn="ctr">
+              <a:buNone/>
+              <a:defRPr sz="1600"/>
+            </a:lvl5pPr>
+            <a:lvl6pPr marL="2286000" indent="0" algn="ctr">
+              <a:buNone/>
+              <a:defRPr sz="1600"/>
+            </a:lvl6pPr>
+            <a:lvl7pPr marL="2743200" indent="0" algn="ctr">
+              <a:buNone/>
+              <a:defRPr sz="1600"/>
+            </a:lvl7pPr>
+            <a:lvl8pPr marL="3200400" indent="0" algn="ctr">
+              <a:buNone/>
+              <a:defRPr sz="1600"/>
+            </a:lvl8pPr>
+            <a:lvl9pPr marL="3657600" indent="0" algn="ctr">
+              <a:buNone/>
+              <a:defRPr sz="1600"/>
+            </a:lvl9pPr>
+          </a:lstStyle>
+          <a:p>
+            <a:r>
+              <a:rPr lang="en-US" smtClean="0"/>
+              <a:t>Click to edit Master subtitle style</a:t>
+            </a:r>
+            <a:endParaRPr lang="it-IT"/>
+          </a:p>
+        </p:txBody>
+      </p:sp>
+      <p:sp>
+        <p:nvSpPr>
+          <p:cNvPr id="4" name="Date Placeholder 3"/>
+          <p:cNvSpPr>
+            <a:spLocks noGrp="1"/>
+          </p:cNvSpPr>
+          <p:nvPr>
+            <p:ph type="dt" sz="half" idx="10"/>
+          </p:nvPr>
+        </p:nvSpPr>
+        <p:spPr/>
+        <p:txBody>
+          <a:bodyPr/>
+          <a:lstStyle/>
+          <a:p>
+            <a:fld id="{1F56560B-483E-4A05-8895-70AE3E92A743}" type="datetimeFigureOut">
+              <a:rPr lang="it-IT">
+                <a:solidFill>
+                  <a:prstClr val="black">
+                    <a:tint val="75000"/>
+                  </a:prstClr>
+                </a:solidFill>
+              </a:rPr>
+              <a:pPr/>
+              <a:t>01/12/2015</a:t>
+            </a:fld>
+            <a:endParaRPr lang="it-IT">
+              <a:solidFill>
+                <a:prstClr val="black">
+                  <a:tint val="75000"/>
+                </a:prstClr>
+              </a:solidFill>
+            </a:endParaRPr>
+          </a:p>
+        </p:txBody>
+      </p:sp>
+      <p:sp>
+        <p:nvSpPr>
+          <p:cNvPr id="5" name="Footer Placeholder 4"/>
+          <p:cNvSpPr>
+            <a:spLocks noGrp="1"/>
+          </p:cNvSpPr>
+          <p:nvPr>
+            <p:ph type="ftr" sz="quarter" idx="11"/>
+          </p:nvPr>
+        </p:nvSpPr>
+        <p:spPr/>
+        <p:txBody>
+          <a:bodyPr/>
+          <a:lstStyle/>
+          <a:p>
+            <a:endParaRPr lang="it-IT">
+              <a:solidFill>
+                <a:prstClr val="black">
+                  <a:tint val="75000"/>
+                </a:prstClr>
+              </a:solidFill>
+            </a:endParaRPr>
+          </a:p>
+        </p:txBody>
+      </p:sp>
+      <p:sp>
+        <p:nvSpPr>
+          <p:cNvPr id="6" name="Slide Number Placeholder 5"/>
+          <p:cNvSpPr>
+            <a:spLocks noGrp="1"/>
+          </p:cNvSpPr>
+          <p:nvPr>
+            <p:ph type="sldNum" sz="quarter" idx="12"/>
+          </p:nvPr>
+        </p:nvSpPr>
+        <p:spPr/>
+        <p:txBody>
+          <a:bodyPr/>
+          <a:lstStyle/>
+          <a:p>
+            <a:fld id="{8C2BE814-DE07-4B1D-A7DA-665B27D573F8}" type="slidenum">
+              <a:rPr lang="it-IT">
+                <a:solidFill>
+                  <a:prstClr val="black">
+                    <a:tint val="75000"/>
+                  </a:prstClr>
+                </a:solidFill>
+              </a:rPr>
+              <a:pPr/>
+              <a:t>‹#›</a:t>
+            </a:fld>
+            <a:endParaRPr lang="it-IT">
+              <a:solidFill>
+                <a:prstClr val="black">
+                  <a:tint val="75000"/>
+                </a:prstClr>
+              </a:solidFill>
+            </a:endParaRPr>
+          </a:p>
+        </p:txBody>
+      </p:sp>
+    </p:spTree>
+    <p:extLst>
+      <p:ext uri="{BB962C8B-B14F-4D97-AF65-F5344CB8AC3E}">
+        <p14:creationId xmlns:p14="http://schemas.microsoft.com/office/powerpoint/2010/main" val="3354013944"/>
+      </p:ext>
+    </p:extLst>
+  </p:cSld>
+  <p:clrMapOvr>
+    <a:masterClrMapping/>
+  </p:clrMapOvr>
+</p:sldLayout>
+</file>
+
+<file path=ppt/slideLayouts/slideLayout13.xml><?xml version="1.0" encoding="utf-8"?>
+<p:sldLayout xmlns:a="http://schemas.openxmlformats.org/drawingml/2006/main" xmlns:r="http://schemas.openxmlformats.org/officeDocument/2006/relationships" xmlns:p="http://schemas.openxmlformats.org/presentationml/2006/main" type="obj" preserve="1">
+  <p:cSld name="Title and Content">
+    <p:spTree>
+      <p:nvGrpSpPr>
+        <p:cNvPr id="1" name=""/>
+        <p:cNvGrpSpPr/>
+        <p:nvPr/>
+      </p:nvGrpSpPr>
+      <p:grpSpPr>
+        <a:xfrm>
+          <a:off x="0" y="0"/>
+          <a:ext cx="0" cy="0"/>
+          <a:chOff x="0" y="0"/>
+          <a:chExt cx="0" cy="0"/>
+        </a:xfrm>
+      </p:grpSpPr>
+      <p:sp>
+        <p:nvSpPr>
+          <p:cNvPr id="2" name="Title 1"/>
+          <p:cNvSpPr>
+            <a:spLocks noGrp="1"/>
+          </p:cNvSpPr>
+          <p:nvPr>
+            <p:ph type="title"/>
+          </p:nvPr>
+        </p:nvSpPr>
+        <p:spPr/>
+        <p:txBody>
+          <a:bodyPr/>
+          <a:lstStyle/>
+          <a:p>
+            <a:r>
+              <a:rPr lang="en-US" smtClean="0"/>
+              <a:t>Click to edit Master title style</a:t>
+            </a:r>
+            <a:endParaRPr lang="it-IT"/>
+          </a:p>
+        </p:txBody>
+      </p:sp>
+      <p:sp>
+        <p:nvSpPr>
+          <p:cNvPr id="3" name="Content Placeholder 2"/>
+          <p:cNvSpPr>
+            <a:spLocks noGrp="1"/>
+          </p:cNvSpPr>
+          <p:nvPr>
+            <p:ph idx="1"/>
+          </p:nvPr>
+        </p:nvSpPr>
+        <p:spPr/>
+        <p:txBody>
+          <a:bodyPr/>
+          <a:lstStyle/>
+          <a:p>
+            <a:pPr lvl="0"/>
+            <a:r>
+              <a:rPr lang="en-US" smtClean="0"/>
+              <a:t>Click to edit Master text styles</a:t>
+            </a:r>
+          </a:p>
+          <a:p>
+            <a:pPr lvl="1"/>
+            <a:r>
+              <a:rPr lang="en-US" smtClean="0"/>
+              <a:t>Second level</a:t>
+            </a:r>
+          </a:p>
+          <a:p>
+            <a:pPr lvl="2"/>
+            <a:r>
+              <a:rPr lang="en-US" smtClean="0"/>
+              <a:t>Third level</a:t>
+            </a:r>
+          </a:p>
+          <a:p>
+            <a:pPr lvl="3"/>
+            <a:r>
+              <a:rPr lang="en-US" smtClean="0"/>
+              <a:t>Fourth level</a:t>
+            </a:r>
+          </a:p>
+          <a:p>
+            <a:pPr lvl="4"/>
+            <a:r>
+              <a:rPr lang="en-US" smtClean="0"/>
+              <a:t>Fifth level</a:t>
+            </a:r>
+            <a:endParaRPr lang="it-IT"/>
+          </a:p>
+        </p:txBody>
+      </p:sp>
+      <p:sp>
+        <p:nvSpPr>
+          <p:cNvPr id="4" name="Date Placeholder 3"/>
+          <p:cNvSpPr>
+            <a:spLocks noGrp="1"/>
+          </p:cNvSpPr>
+          <p:nvPr>
+            <p:ph type="dt" sz="half" idx="10"/>
+          </p:nvPr>
+        </p:nvSpPr>
+        <p:spPr/>
+        <p:txBody>
+          <a:bodyPr/>
+          <a:lstStyle/>
+          <a:p>
+            <a:fld id="{1F56560B-483E-4A05-8895-70AE3E92A743}" type="datetimeFigureOut">
+              <a:rPr lang="it-IT">
+                <a:solidFill>
+                  <a:prstClr val="black">
+                    <a:tint val="75000"/>
+                  </a:prstClr>
+                </a:solidFill>
+              </a:rPr>
+              <a:pPr/>
+              <a:t>01/12/2015</a:t>
+            </a:fld>
+            <a:endParaRPr lang="it-IT">
+              <a:solidFill>
+                <a:prstClr val="black">
+                  <a:tint val="75000"/>
+                </a:prstClr>
+              </a:solidFill>
+            </a:endParaRPr>
+          </a:p>
+        </p:txBody>
+      </p:sp>
+      <p:sp>
+        <p:nvSpPr>
+          <p:cNvPr id="5" name="Footer Placeholder 4"/>
+          <p:cNvSpPr>
+            <a:spLocks noGrp="1"/>
+          </p:cNvSpPr>
+          <p:nvPr>
+            <p:ph type="ftr" sz="quarter" idx="11"/>
+          </p:nvPr>
+        </p:nvSpPr>
+        <p:spPr/>
+        <p:txBody>
+          <a:bodyPr/>
+          <a:lstStyle/>
+          <a:p>
+            <a:endParaRPr lang="it-IT">
+              <a:solidFill>
+                <a:prstClr val="black">
+                  <a:tint val="75000"/>
+                </a:prstClr>
+              </a:solidFill>
+            </a:endParaRPr>
+          </a:p>
+        </p:txBody>
+      </p:sp>
+      <p:sp>
+        <p:nvSpPr>
+          <p:cNvPr id="6" name="Slide Number Placeholder 5"/>
+          <p:cNvSpPr>
+            <a:spLocks noGrp="1"/>
+          </p:cNvSpPr>
+          <p:nvPr>
+            <p:ph type="sldNum" sz="quarter" idx="12"/>
+          </p:nvPr>
+        </p:nvSpPr>
+        <p:spPr/>
+        <p:txBody>
+          <a:bodyPr/>
+          <a:lstStyle/>
+          <a:p>
+            <a:fld id="{8C2BE814-DE07-4B1D-A7DA-665B27D573F8}" type="slidenum">
+              <a:rPr lang="it-IT">
+                <a:solidFill>
+                  <a:prstClr val="black">
+                    <a:tint val="75000"/>
+                  </a:prstClr>
+                </a:solidFill>
+              </a:rPr>
+              <a:pPr/>
+              <a:t>‹#›</a:t>
+            </a:fld>
+            <a:endParaRPr lang="it-IT">
+              <a:solidFill>
+                <a:prstClr val="black">
+                  <a:tint val="75000"/>
+                </a:prstClr>
+              </a:solidFill>
+            </a:endParaRPr>
+          </a:p>
+        </p:txBody>
+      </p:sp>
+    </p:spTree>
+    <p:extLst>
+      <p:ext uri="{BB962C8B-B14F-4D97-AF65-F5344CB8AC3E}">
+        <p14:creationId xmlns:p14="http://schemas.microsoft.com/office/powerpoint/2010/main" val="3481958780"/>
+      </p:ext>
+    </p:extLst>
+  </p:cSld>
+  <p:clrMapOvr>
+    <a:masterClrMapping/>
+  </p:clrMapOvr>
+</p:sldLayout>
+</file>
+
+<file path=ppt/slideLayouts/slideLayout14.xml><?xml version="1.0" encoding="utf-8"?>
+<p:sldLayout xmlns:a="http://schemas.openxmlformats.org/drawingml/2006/main" xmlns:r="http://schemas.openxmlformats.org/officeDocument/2006/relationships" xmlns:p="http://schemas.openxmlformats.org/presentationml/2006/main" type="secHead" preserve="1">
+  <p:cSld name="Section Header">
+    <p:spTree>
+      <p:nvGrpSpPr>
+        <p:cNvPr id="1" name=""/>
+        <p:cNvGrpSpPr/>
+        <p:nvPr/>
+      </p:nvGrpSpPr>
+      <p:grpSpPr>
+        <a:xfrm>
+          <a:off x="0" y="0"/>
+          <a:ext cx="0" cy="0"/>
+          <a:chOff x="0" y="0"/>
+          <a:chExt cx="0" cy="0"/>
+        </a:xfrm>
+      </p:grpSpPr>
+      <p:sp>
+        <p:nvSpPr>
+          <p:cNvPr id="2" name="Title 1"/>
+          <p:cNvSpPr>
+            <a:spLocks noGrp="1"/>
+          </p:cNvSpPr>
+          <p:nvPr>
+            <p:ph type="title"/>
+          </p:nvPr>
+        </p:nvSpPr>
+        <p:spPr>
+          <a:xfrm>
+            <a:off x="831850" y="1709738"/>
+            <a:ext cx="10515600" cy="2852737"/>
+          </a:xfrm>
+        </p:spPr>
+        <p:txBody>
+          <a:bodyPr anchor="b"/>
+          <a:lstStyle>
+            <a:lvl1pPr>
+              <a:defRPr sz="6000"/>
+            </a:lvl1pPr>
+          </a:lstStyle>
+          <a:p>
+            <a:r>
+              <a:rPr lang="en-US" smtClean="0"/>
+              <a:t>Click to edit Master title style</a:t>
+            </a:r>
+            <a:endParaRPr lang="it-IT"/>
+          </a:p>
+        </p:txBody>
+      </p:sp>
+      <p:sp>
+        <p:nvSpPr>
+          <p:cNvPr id="3" name="Text Placeholder 2"/>
+          <p:cNvSpPr>
+            <a:spLocks noGrp="1"/>
+          </p:cNvSpPr>
+          <p:nvPr>
+            <p:ph type="body" idx="1"/>
+          </p:nvPr>
+        </p:nvSpPr>
+        <p:spPr>
+          <a:xfrm>
+            <a:off x="831850" y="4589463"/>
+            <a:ext cx="10515600" cy="1500187"/>
+          </a:xfrm>
+        </p:spPr>
+        <p:txBody>
+          <a:bodyPr/>
+          <a:lstStyle>
+            <a:lvl1pPr marL="0" indent="0">
+              <a:buNone/>
+              <a:defRPr sz="2400">
+                <a:solidFill>
+                  <a:schemeClr val="tx1">
+                    <a:tint val="75000"/>
+                  </a:schemeClr>
+                </a:solidFill>
+              </a:defRPr>
+            </a:lvl1pPr>
+            <a:lvl2pPr marL="457200" indent="0">
+              <a:buNone/>
+              <a:defRPr sz="2000">
+                <a:solidFill>
+                  <a:schemeClr val="tx1">
+                    <a:tint val="75000"/>
+                  </a:schemeClr>
+                </a:solidFill>
+              </a:defRPr>
+            </a:lvl2pPr>
+            <a:lvl3pPr marL="914400" indent="0">
+              <a:buNone/>
+              <a:defRPr sz="1800">
+                <a:solidFill>
+                  <a:schemeClr val="tx1">
+                    <a:tint val="75000"/>
+                  </a:schemeClr>
+                </a:solidFill>
+              </a:defRPr>
+            </a:lvl3pPr>
+            <a:lvl4pPr marL="1371600" indent="0">
+              <a:buNone/>
+              <a:defRPr sz="1600">
+                <a:solidFill>
+                  <a:schemeClr val="tx1">
+                    <a:tint val="75000"/>
+                  </a:schemeClr>
+                </a:solidFill>
+              </a:defRPr>
+            </a:lvl4pPr>
+            <a:lvl5pPr marL="1828800" indent="0">
+              <a:buNone/>
+              <a:defRPr sz="1600">
+                <a:solidFill>
+                  <a:schemeClr val="tx1">
+                    <a:tint val="75000"/>
+                  </a:schemeClr>
+                </a:solidFill>
+              </a:defRPr>
+            </a:lvl5pPr>
+            <a:lvl6pPr marL="2286000" indent="0">
+              <a:buNone/>
+              <a:defRPr sz="1600">
+                <a:solidFill>
+                  <a:schemeClr val="tx1">
+                    <a:tint val="75000"/>
+                  </a:schemeClr>
+                </a:solidFill>
+              </a:defRPr>
+            </a:lvl6pPr>
+            <a:lvl7pPr marL="2743200" indent="0">
+              <a:buNone/>
+              <a:defRPr sz="1600">
+                <a:solidFill>
+                  <a:schemeClr val="tx1">
+                    <a:tint val="75000"/>
+                  </a:schemeClr>
+                </a:solidFill>
+              </a:defRPr>
+            </a:lvl7pPr>
+            <a:lvl8pPr marL="3200400" indent="0">
+              <a:buNone/>
+              <a:defRPr sz="1600">
+                <a:solidFill>
+                  <a:schemeClr val="tx1">
+                    <a:tint val="75000"/>
+                  </a:schemeClr>
+                </a:solidFill>
+              </a:defRPr>
+            </a:lvl8pPr>
+            <a:lvl9pPr marL="3657600" indent="0">
+              <a:buNone/>
+              <a:defRPr sz="1600">
+                <a:solidFill>
+                  <a:schemeClr val="tx1">
+                    <a:tint val="75000"/>
+                  </a:schemeClr>
+                </a:solidFill>
+              </a:defRPr>
+            </a:lvl9pPr>
+          </a:lstStyle>
+          <a:p>
+            <a:pPr lvl="0"/>
+            <a:r>
+              <a:rPr lang="en-US" smtClean="0"/>
+              <a:t>Click to edit Master text styles</a:t>
+            </a:r>
+          </a:p>
+        </p:txBody>
+      </p:sp>
+      <p:sp>
+        <p:nvSpPr>
+          <p:cNvPr id="4" name="Date Placeholder 3"/>
+          <p:cNvSpPr>
+            <a:spLocks noGrp="1"/>
+          </p:cNvSpPr>
+          <p:nvPr>
+            <p:ph type="dt" sz="half" idx="10"/>
+          </p:nvPr>
+        </p:nvSpPr>
+        <p:spPr/>
+        <p:txBody>
+          <a:bodyPr/>
+          <a:lstStyle/>
+          <a:p>
+            <a:fld id="{1F56560B-483E-4A05-8895-70AE3E92A743}" type="datetimeFigureOut">
+              <a:rPr lang="it-IT">
+                <a:solidFill>
+                  <a:prstClr val="black">
+                    <a:tint val="75000"/>
+                  </a:prstClr>
+                </a:solidFill>
+              </a:rPr>
+              <a:pPr/>
+              <a:t>01/12/2015</a:t>
+            </a:fld>
+            <a:endParaRPr lang="it-IT">
+              <a:solidFill>
+                <a:prstClr val="black">
+                  <a:tint val="75000"/>
+                </a:prstClr>
+              </a:solidFill>
+            </a:endParaRPr>
+          </a:p>
+        </p:txBody>
+      </p:sp>
+      <p:sp>
+        <p:nvSpPr>
+          <p:cNvPr id="5" name="Footer Placeholder 4"/>
+          <p:cNvSpPr>
+            <a:spLocks noGrp="1"/>
+          </p:cNvSpPr>
+          <p:nvPr>
+            <p:ph type="ftr" sz="quarter" idx="11"/>
+          </p:nvPr>
+        </p:nvSpPr>
+        <p:spPr/>
+        <p:txBody>
+          <a:bodyPr/>
+          <a:lstStyle/>
+          <a:p>
+            <a:endParaRPr lang="it-IT">
+              <a:solidFill>
+                <a:prstClr val="black">
+                  <a:tint val="75000"/>
+                </a:prstClr>
+              </a:solidFill>
+            </a:endParaRPr>
+          </a:p>
+        </p:txBody>
+      </p:sp>
+      <p:sp>
+        <p:nvSpPr>
+          <p:cNvPr id="6" name="Slide Number Placeholder 5"/>
+          <p:cNvSpPr>
+            <a:spLocks noGrp="1"/>
+          </p:cNvSpPr>
+          <p:nvPr>
+            <p:ph type="sldNum" sz="quarter" idx="12"/>
+          </p:nvPr>
+        </p:nvSpPr>
+        <p:spPr/>
+        <p:txBody>
+          <a:bodyPr/>
+          <a:lstStyle/>
+          <a:p>
+            <a:fld id="{8C2BE814-DE07-4B1D-A7DA-665B27D573F8}" type="slidenum">
+              <a:rPr lang="it-IT">
+                <a:solidFill>
+                  <a:prstClr val="black">
+                    <a:tint val="75000"/>
+                  </a:prstClr>
+                </a:solidFill>
+              </a:rPr>
+              <a:pPr/>
+              <a:t>‹#›</a:t>
+            </a:fld>
+            <a:endParaRPr lang="it-IT">
+              <a:solidFill>
+                <a:prstClr val="black">
+                  <a:tint val="75000"/>
+                </a:prstClr>
+              </a:solidFill>
+            </a:endParaRPr>
+          </a:p>
+        </p:txBody>
+      </p:sp>
+    </p:spTree>
+    <p:extLst>
+      <p:ext uri="{BB962C8B-B14F-4D97-AF65-F5344CB8AC3E}">
+        <p14:creationId xmlns:p14="http://schemas.microsoft.com/office/powerpoint/2010/main" val="1979198556"/>
+      </p:ext>
+    </p:extLst>
+  </p:cSld>
+  <p:clrMapOvr>
+    <a:masterClrMapping/>
+  </p:clrMapOvr>
+</p:sldLayout>
+</file>
+
+<file path=ppt/slideLayouts/slideLayout15.xml><?xml version="1.0" encoding="utf-8"?>
+<p:sldLayout xmlns:a="http://schemas.openxmlformats.org/drawingml/2006/main" xmlns:r="http://schemas.openxmlformats.org/officeDocument/2006/relationships" xmlns:p="http://schemas.openxmlformats.org/presentationml/2006/main" type="twoObj" preserve="1">
+  <p:cSld name="Two Content">
+    <p:spTree>
+      <p:nvGrpSpPr>
+        <p:cNvPr id="1" name=""/>
+        <p:cNvGrpSpPr/>
+        <p:nvPr/>
+      </p:nvGrpSpPr>
+      <p:grpSpPr>
+        <a:xfrm>
+          <a:off x="0" y="0"/>
+          <a:ext cx="0" cy="0"/>
+          <a:chOff x="0" y="0"/>
+          <a:chExt cx="0" cy="0"/>
+        </a:xfrm>
+      </p:grpSpPr>
+      <p:sp>
+        <p:nvSpPr>
+          <p:cNvPr id="2" name="Title 1"/>
+          <p:cNvSpPr>
+            <a:spLocks noGrp="1"/>
+          </p:cNvSpPr>
+          <p:nvPr>
+            <p:ph type="title"/>
+          </p:nvPr>
+        </p:nvSpPr>
+        <p:spPr/>
+        <p:txBody>
+          <a:bodyPr/>
+          <a:lstStyle/>
+          <a:p>
+            <a:r>
+              <a:rPr lang="en-US" smtClean="0"/>
+              <a:t>Click to edit Master title style</a:t>
+            </a:r>
+            <a:endParaRPr lang="it-IT"/>
+          </a:p>
+        </p:txBody>
+      </p:sp>
+      <p:sp>
+        <p:nvSpPr>
+          <p:cNvPr id="3" name="Content Placeholder 2"/>
+          <p:cNvSpPr>
+            <a:spLocks noGrp="1"/>
+          </p:cNvSpPr>
+          <p:nvPr>
+            <p:ph sz="half" idx="1"/>
+          </p:nvPr>
+        </p:nvSpPr>
+        <p:spPr>
+          <a:xfrm>
+            <a:off x="838200" y="1825625"/>
+            <a:ext cx="5181600" cy="4351338"/>
+          </a:xfrm>
+        </p:spPr>
+        <p:txBody>
+          <a:bodyPr/>
+          <a:lstStyle/>
+          <a:p>
+            <a:pPr lvl="0"/>
+            <a:r>
+              <a:rPr lang="en-US" smtClean="0"/>
+              <a:t>Click to edit Master text styles</a:t>
+            </a:r>
+          </a:p>
+          <a:p>
+            <a:pPr lvl="1"/>
+            <a:r>
+              <a:rPr lang="en-US" smtClean="0"/>
+              <a:t>Second level</a:t>
+            </a:r>
+          </a:p>
+          <a:p>
+            <a:pPr lvl="2"/>
+            <a:r>
+              <a:rPr lang="en-US" smtClean="0"/>
+              <a:t>Third level</a:t>
+            </a:r>
+          </a:p>
+          <a:p>
+            <a:pPr lvl="3"/>
+            <a:r>
+              <a:rPr lang="en-US" smtClean="0"/>
+              <a:t>Fourth level</a:t>
+            </a:r>
+          </a:p>
+          <a:p>
+            <a:pPr lvl="4"/>
+            <a:r>
+              <a:rPr lang="en-US" smtClean="0"/>
+              <a:t>Fifth level</a:t>
+            </a:r>
+            <a:endParaRPr lang="it-IT"/>
+          </a:p>
+        </p:txBody>
+      </p:sp>
+      <p:sp>
+        <p:nvSpPr>
+          <p:cNvPr id="4" name="Content Placeholder 3"/>
+          <p:cNvSpPr>
+            <a:spLocks noGrp="1"/>
+          </p:cNvSpPr>
+          <p:nvPr>
+            <p:ph sz="half" idx="2"/>
+          </p:nvPr>
+        </p:nvSpPr>
+        <p:spPr>
+          <a:xfrm>
+            <a:off x="6172200" y="1825625"/>
+            <a:ext cx="5181600" cy="4351338"/>
+          </a:xfrm>
+        </p:spPr>
+        <p:txBody>
+          <a:bodyPr/>
+          <a:lstStyle/>
+          <a:p>
+            <a:pPr lvl="0"/>
+            <a:r>
+              <a:rPr lang="en-US" smtClean="0"/>
+              <a:t>Click to edit Master text styles</a:t>
+            </a:r>
+          </a:p>
+          <a:p>
+            <a:pPr lvl="1"/>
+            <a:r>
+              <a:rPr lang="en-US" smtClean="0"/>
+              <a:t>Second level</a:t>
+            </a:r>
+          </a:p>
+          <a:p>
+            <a:pPr lvl="2"/>
+            <a:r>
+              <a:rPr lang="en-US" smtClean="0"/>
+              <a:t>Third level</a:t>
+            </a:r>
+          </a:p>
+          <a:p>
+            <a:pPr lvl="3"/>
+            <a:r>
+              <a:rPr lang="en-US" smtClean="0"/>
+              <a:t>Fourth level</a:t>
+            </a:r>
+          </a:p>
+          <a:p>
+            <a:pPr lvl="4"/>
+            <a:r>
+              <a:rPr lang="en-US" smtClean="0"/>
+              <a:t>Fifth level</a:t>
+            </a:r>
+            <a:endParaRPr lang="it-IT"/>
+          </a:p>
+        </p:txBody>
+      </p:sp>
+      <p:sp>
+        <p:nvSpPr>
+          <p:cNvPr id="5" name="Date Placeholder 4"/>
+          <p:cNvSpPr>
+            <a:spLocks noGrp="1"/>
+          </p:cNvSpPr>
+          <p:nvPr>
+            <p:ph type="dt" sz="half" idx="10"/>
+          </p:nvPr>
+        </p:nvSpPr>
+        <p:spPr/>
+        <p:txBody>
+          <a:bodyPr/>
+          <a:lstStyle/>
+          <a:p>
+            <a:fld id="{1F56560B-483E-4A05-8895-70AE3E92A743}" type="datetimeFigureOut">
+              <a:rPr lang="it-IT">
+                <a:solidFill>
+                  <a:prstClr val="black">
+                    <a:tint val="75000"/>
+                  </a:prstClr>
+                </a:solidFill>
+              </a:rPr>
+              <a:pPr/>
+              <a:t>01/12/2015</a:t>
+            </a:fld>
+            <a:endParaRPr lang="it-IT">
+              <a:solidFill>
+                <a:prstClr val="black">
+                  <a:tint val="75000"/>
+                </a:prstClr>
+              </a:solidFill>
+            </a:endParaRPr>
+          </a:p>
+        </p:txBody>
+      </p:sp>
+      <p:sp>
+        <p:nvSpPr>
+          <p:cNvPr id="6" name="Footer Placeholder 5"/>
+          <p:cNvSpPr>
+            <a:spLocks noGrp="1"/>
+          </p:cNvSpPr>
+          <p:nvPr>
+            <p:ph type="ftr" sz="quarter" idx="11"/>
+          </p:nvPr>
+        </p:nvSpPr>
+        <p:spPr/>
+        <p:txBody>
+          <a:bodyPr/>
+          <a:lstStyle/>
+          <a:p>
+            <a:endParaRPr lang="it-IT">
+              <a:solidFill>
+                <a:prstClr val="black">
+                  <a:tint val="75000"/>
+                </a:prstClr>
+              </a:solidFill>
+            </a:endParaRPr>
+          </a:p>
+        </p:txBody>
+      </p:sp>
+      <p:sp>
+        <p:nvSpPr>
+          <p:cNvPr id="7" name="Slide Number Placeholder 6"/>
+          <p:cNvSpPr>
+            <a:spLocks noGrp="1"/>
+          </p:cNvSpPr>
+          <p:nvPr>
+            <p:ph type="sldNum" sz="quarter" idx="12"/>
+          </p:nvPr>
+        </p:nvSpPr>
+        <p:spPr/>
+        <p:txBody>
+          <a:bodyPr/>
+          <a:lstStyle/>
+          <a:p>
+            <a:fld id="{8C2BE814-DE07-4B1D-A7DA-665B27D573F8}" type="slidenum">
+              <a:rPr lang="it-IT">
+                <a:solidFill>
+                  <a:prstClr val="black">
+                    <a:tint val="75000"/>
+                  </a:prstClr>
+                </a:solidFill>
+              </a:rPr>
+              <a:pPr/>
+              <a:t>‹#›</a:t>
+            </a:fld>
+            <a:endParaRPr lang="it-IT">
+              <a:solidFill>
+                <a:prstClr val="black">
+                  <a:tint val="75000"/>
+                </a:prstClr>
+              </a:solidFill>
+            </a:endParaRPr>
+          </a:p>
+        </p:txBody>
+      </p:sp>
+    </p:spTree>
+    <p:extLst>
+      <p:ext uri="{BB962C8B-B14F-4D97-AF65-F5344CB8AC3E}">
+        <p14:creationId xmlns:p14="http://schemas.microsoft.com/office/powerpoint/2010/main" val="1650776253"/>
+      </p:ext>
+    </p:extLst>
+  </p:cSld>
+  <p:clrMapOvr>
+    <a:masterClrMapping/>
+  </p:clrMapOvr>
+</p:sldLayout>
+</file>
+
+<file path=ppt/slideLayouts/slideLayout16.xml><?xml version="1.0" encoding="utf-8"?>
+<p:sldLayout xmlns:a="http://schemas.openxmlformats.org/drawingml/2006/main" xmlns:r="http://schemas.openxmlformats.org/officeDocument/2006/relationships" xmlns:p="http://schemas.openxmlformats.org/presentationml/2006/main" type="twoTxTwoObj" preserve="1">
+  <p:cSld name="Comparison">
+    <p:spTree>
+      <p:nvGrpSpPr>
+        <p:cNvPr id="1" name=""/>
+        <p:cNvGrpSpPr/>
+        <p:nvPr/>
+      </p:nvGrpSpPr>
+      <p:grpSpPr>
+        <a:xfrm>
+          <a:off x="0" y="0"/>
+          <a:ext cx="0" cy="0"/>
+          <a:chOff x="0" y="0"/>
+          <a:chExt cx="0" cy="0"/>
+        </a:xfrm>
+      </p:grpSpPr>
+      <p:sp>
+        <p:nvSpPr>
+          <p:cNvPr id="2" name="Title 1"/>
+          <p:cNvSpPr>
+            <a:spLocks noGrp="1"/>
+          </p:cNvSpPr>
+          <p:nvPr>
+            <p:ph type="title"/>
+          </p:nvPr>
+        </p:nvSpPr>
+        <p:spPr>
+          <a:xfrm>
+            <a:off x="839788" y="365125"/>
+            <a:ext cx="10515600" cy="1325563"/>
+          </a:xfrm>
+        </p:spPr>
+        <p:txBody>
+          <a:bodyPr/>
+          <a:lstStyle/>
+          <a:p>
+            <a:r>
+              <a:rPr lang="en-US" smtClean="0"/>
+              <a:t>Click to edit Master title style</a:t>
+            </a:r>
+            <a:endParaRPr lang="it-IT"/>
+          </a:p>
+        </p:txBody>
+      </p:sp>
+      <p:sp>
+        <p:nvSpPr>
+          <p:cNvPr id="3" name="Text Placeholder 2"/>
+          <p:cNvSpPr>
+            <a:spLocks noGrp="1"/>
+          </p:cNvSpPr>
+          <p:nvPr>
+            <p:ph type="body" idx="1"/>
+          </p:nvPr>
+        </p:nvSpPr>
+        <p:spPr>
+          <a:xfrm>
+            <a:off x="839788" y="1681163"/>
+            <a:ext cx="5157787" cy="823912"/>
+          </a:xfrm>
+        </p:spPr>
+        <p:txBody>
+          <a:bodyPr anchor="b"/>
+          <a:lstStyle>
+            <a:lvl1pPr marL="0" indent="0">
+              <a:buNone/>
+              <a:defRPr sz="2400" b="1"/>
+            </a:lvl1pPr>
+            <a:lvl2pPr marL="457200" indent="0">
+              <a:buNone/>
+              <a:defRPr sz="2000" b="1"/>
+            </a:lvl2pPr>
+            <a:lvl3pPr marL="914400" indent="0">
+              <a:buNone/>
+              <a:defRPr sz="1800" b="1"/>
+            </a:lvl3pPr>
+            <a:lvl4pPr marL="1371600" indent="0">
+              <a:buNone/>
+              <a:defRPr sz="1600" b="1"/>
+            </a:lvl4pPr>
+            <a:lvl5pPr marL="1828800" indent="0">
+              <a:buNone/>
+              <a:defRPr sz="1600" b="1"/>
+            </a:lvl5pPr>
+            <a:lvl6pPr marL="2286000" indent="0">
+              <a:buNone/>
+              <a:defRPr sz="1600" b="1"/>
+            </a:lvl6pPr>
+            <a:lvl7pPr marL="2743200" indent="0">
+              <a:buNone/>
+              <a:defRPr sz="1600" b="1"/>
+            </a:lvl7pPr>
+            <a:lvl8pPr marL="3200400" indent="0">
+              <a:buNone/>
+              <a:defRPr sz="1600" b="1"/>
+            </a:lvl8pPr>
+            <a:lvl9pPr marL="3657600" indent="0">
+              <a:buNone/>
+              <a:defRPr sz="1600" b="1"/>
+            </a:lvl9pPr>
+          </a:lstStyle>
+          <a:p>
+            <a:pPr lvl="0"/>
+            <a:r>
+              <a:rPr lang="en-US" smtClean="0"/>
+              <a:t>Click to edit Master text styles</a:t>
+            </a:r>
+          </a:p>
+        </p:txBody>
+      </p:sp>
+      <p:sp>
+        <p:nvSpPr>
+          <p:cNvPr id="4" name="Content Placeholder 3"/>
+          <p:cNvSpPr>
+            <a:spLocks noGrp="1"/>
+          </p:cNvSpPr>
+          <p:nvPr>
+            <p:ph sz="half" idx="2"/>
+          </p:nvPr>
+        </p:nvSpPr>
+        <p:spPr>
+          <a:xfrm>
+            <a:off x="839788" y="2505075"/>
+            <a:ext cx="5157787" cy="3684588"/>
+          </a:xfrm>
+        </p:spPr>
+        <p:txBody>
+          <a:bodyPr/>
+          <a:lstStyle/>
+          <a:p>
+            <a:pPr lvl="0"/>
+            <a:r>
+              <a:rPr lang="en-US" smtClean="0"/>
+              <a:t>Click to edit Master text styles</a:t>
+            </a:r>
+          </a:p>
+          <a:p>
+            <a:pPr lvl="1"/>
+            <a:r>
+              <a:rPr lang="en-US" smtClean="0"/>
+              <a:t>Second level</a:t>
+            </a:r>
+          </a:p>
+          <a:p>
+            <a:pPr lvl="2"/>
+            <a:r>
+              <a:rPr lang="en-US" smtClean="0"/>
+              <a:t>Third level</a:t>
+            </a:r>
+          </a:p>
+          <a:p>
+            <a:pPr lvl="3"/>
+            <a:r>
+              <a:rPr lang="en-US" smtClean="0"/>
+              <a:t>Fourth level</a:t>
+            </a:r>
+          </a:p>
+          <a:p>
+            <a:pPr lvl="4"/>
+            <a:r>
+              <a:rPr lang="en-US" smtClean="0"/>
+              <a:t>Fifth level</a:t>
+            </a:r>
+            <a:endParaRPr lang="it-IT"/>
+          </a:p>
+        </p:txBody>
+      </p:sp>
+      <p:sp>
+        <p:nvSpPr>
+          <p:cNvPr id="5" name="Text Placeholder 4"/>
+          <p:cNvSpPr>
+            <a:spLocks noGrp="1"/>
+          </p:cNvSpPr>
+          <p:nvPr>
+            <p:ph type="body" sz="quarter" idx="3"/>
+          </p:nvPr>
+        </p:nvSpPr>
+        <p:spPr>
+          <a:xfrm>
+            <a:off x="6172200" y="1681163"/>
+            <a:ext cx="5183188" cy="823912"/>
+          </a:xfrm>
+        </p:spPr>
+        <p:txBody>
+          <a:bodyPr anchor="b"/>
+          <a:lstStyle>
+            <a:lvl1pPr marL="0" indent="0">
+              <a:buNone/>
+              <a:defRPr sz="2400" b="1"/>
+            </a:lvl1pPr>
+            <a:lvl2pPr marL="457200" indent="0">
+              <a:buNone/>
+              <a:defRPr sz="2000" b="1"/>
+            </a:lvl2pPr>
+            <a:lvl3pPr marL="914400" indent="0">
+              <a:buNone/>
+              <a:defRPr sz="1800" b="1"/>
+            </a:lvl3pPr>
+            <a:lvl4pPr marL="1371600" indent="0">
+              <a:buNone/>
+              <a:defRPr sz="1600" b="1"/>
+            </a:lvl4pPr>
+            <a:lvl5pPr marL="1828800" indent="0">
+              <a:buNone/>
+              <a:defRPr sz="1600" b="1"/>
+            </a:lvl5pPr>
+            <a:lvl6pPr marL="2286000" indent="0">
+              <a:buNone/>
+              <a:defRPr sz="1600" b="1"/>
+            </a:lvl6pPr>
+            <a:lvl7pPr marL="2743200" indent="0">
+              <a:buNone/>
+              <a:defRPr sz="1600" b="1"/>
+            </a:lvl7pPr>
+            <a:lvl8pPr marL="3200400" indent="0">
+              <a:buNone/>
+              <a:defRPr sz="1600" b="1"/>
+            </a:lvl8pPr>
+            <a:lvl9pPr marL="3657600" indent="0">
+              <a:buNone/>
+              <a:defRPr sz="1600" b="1"/>
+            </a:lvl9pPr>
+          </a:lstStyle>
+          <a:p>
+            <a:pPr lvl="0"/>
+            <a:r>
+              <a:rPr lang="en-US" smtClean="0"/>
+              <a:t>Click to edit Master text styles</a:t>
+            </a:r>
+          </a:p>
+        </p:txBody>
+      </p:sp>
+      <p:sp>
+        <p:nvSpPr>
+          <p:cNvPr id="6" name="Content Placeholder 5"/>
+          <p:cNvSpPr>
+            <a:spLocks noGrp="1"/>
+          </p:cNvSpPr>
+          <p:nvPr>
+            <p:ph sz="quarter" idx="4"/>
+          </p:nvPr>
+        </p:nvSpPr>
+        <p:spPr>
+          <a:xfrm>
+            <a:off x="6172200" y="2505075"/>
+            <a:ext cx="5183188" cy="3684588"/>
+          </a:xfrm>
+        </p:spPr>
+        <p:txBody>
+          <a:bodyPr/>
+          <a:lstStyle/>
+          <a:p>
+            <a:pPr lvl="0"/>
+            <a:r>
+              <a:rPr lang="en-US" smtClean="0"/>
+              <a:t>Click to edit Master text styles</a:t>
+            </a:r>
+          </a:p>
+          <a:p>
+            <a:pPr lvl="1"/>
+            <a:r>
+              <a:rPr lang="en-US" smtClean="0"/>
+              <a:t>Second level</a:t>
+            </a:r>
+          </a:p>
+          <a:p>
+            <a:pPr lvl="2"/>
+            <a:r>
+              <a:rPr lang="en-US" smtClean="0"/>
+              <a:t>Third level</a:t>
+            </a:r>
+          </a:p>
+          <a:p>
+            <a:pPr lvl="3"/>
+            <a:r>
+              <a:rPr lang="en-US" smtClean="0"/>
+              <a:t>Fourth level</a:t>
+            </a:r>
+          </a:p>
+          <a:p>
+            <a:pPr lvl="4"/>
+            <a:r>
+              <a:rPr lang="en-US" smtClean="0"/>
+              <a:t>Fifth level</a:t>
+            </a:r>
+            <a:endParaRPr lang="it-IT"/>
+          </a:p>
+        </p:txBody>
+      </p:sp>
+      <p:sp>
+        <p:nvSpPr>
+          <p:cNvPr id="7" name="Date Placeholder 6"/>
+          <p:cNvSpPr>
+            <a:spLocks noGrp="1"/>
+          </p:cNvSpPr>
+          <p:nvPr>
+            <p:ph type="dt" sz="half" idx="10"/>
+          </p:nvPr>
+        </p:nvSpPr>
+        <p:spPr/>
+        <p:txBody>
+          <a:bodyPr/>
+          <a:lstStyle/>
+          <a:p>
+            <a:fld id="{1F56560B-483E-4A05-8895-70AE3E92A743}" type="datetimeFigureOut">
+              <a:rPr lang="it-IT">
+                <a:solidFill>
+                  <a:prstClr val="black">
+                    <a:tint val="75000"/>
+                  </a:prstClr>
+                </a:solidFill>
+              </a:rPr>
+              <a:pPr/>
+              <a:t>01/12/2015</a:t>
+            </a:fld>
+            <a:endParaRPr lang="it-IT">
+              <a:solidFill>
+                <a:prstClr val="black">
+                  <a:tint val="75000"/>
+                </a:prstClr>
+              </a:solidFill>
+            </a:endParaRPr>
+          </a:p>
+        </p:txBody>
+      </p:sp>
+      <p:sp>
+        <p:nvSpPr>
+          <p:cNvPr id="8" name="Footer Placeholder 7"/>
+          <p:cNvSpPr>
+            <a:spLocks noGrp="1"/>
+          </p:cNvSpPr>
+          <p:nvPr>
+            <p:ph type="ftr" sz="quarter" idx="11"/>
+          </p:nvPr>
+        </p:nvSpPr>
+        <p:spPr/>
+        <p:txBody>
+          <a:bodyPr/>
+          <a:lstStyle/>
+          <a:p>
+            <a:endParaRPr lang="it-IT">
+              <a:solidFill>
+                <a:prstClr val="black">
+                  <a:tint val="75000"/>
+                </a:prstClr>
+              </a:solidFill>
+            </a:endParaRPr>
+          </a:p>
+        </p:txBody>
+      </p:sp>
+      <p:sp>
+        <p:nvSpPr>
+          <p:cNvPr id="9" name="Slide Number Placeholder 8"/>
+          <p:cNvSpPr>
+            <a:spLocks noGrp="1"/>
+          </p:cNvSpPr>
+          <p:nvPr>
+            <p:ph type="sldNum" sz="quarter" idx="12"/>
+          </p:nvPr>
+        </p:nvSpPr>
+        <p:spPr/>
+        <p:txBody>
+          <a:bodyPr/>
+          <a:lstStyle/>
+          <a:p>
+            <a:fld id="{8C2BE814-DE07-4B1D-A7DA-665B27D573F8}" type="slidenum">
+              <a:rPr lang="it-IT">
+                <a:solidFill>
+                  <a:prstClr val="black">
+                    <a:tint val="75000"/>
+                  </a:prstClr>
+                </a:solidFill>
+              </a:rPr>
+              <a:pPr/>
+              <a:t>‹#›</a:t>
+            </a:fld>
+            <a:endParaRPr lang="it-IT">
+              <a:solidFill>
+                <a:prstClr val="black">
+                  <a:tint val="75000"/>
+                </a:prstClr>
+              </a:solidFill>
+            </a:endParaRPr>
+          </a:p>
+        </p:txBody>
+      </p:sp>
+    </p:spTree>
+    <p:extLst>
+      <p:ext uri="{BB962C8B-B14F-4D97-AF65-F5344CB8AC3E}">
+        <p14:creationId xmlns:p14="http://schemas.microsoft.com/office/powerpoint/2010/main" val="4280619103"/>
+      </p:ext>
+    </p:extLst>
+  </p:cSld>
+  <p:clrMapOvr>
+    <a:masterClrMapping/>
+  </p:clrMapOvr>
+</p:sldLayout>
+</file>
+
+<file path=ppt/slideLayouts/slideLayout17.xml><?xml version="1.0" encoding="utf-8"?>
+<p:sldLayout xmlns:a="http://schemas.openxmlformats.org/drawingml/2006/main" xmlns:r="http://schemas.openxmlformats.org/officeDocument/2006/relationships" xmlns:p="http://schemas.openxmlformats.org/presentationml/2006/main" type="titleOnly" preserve="1">
+  <p:cSld name="Title Only">
+    <p:spTree>
+      <p:nvGrpSpPr>
+        <p:cNvPr id="1" name=""/>
+        <p:cNvGrpSpPr/>
+        <p:nvPr/>
+      </p:nvGrpSpPr>
+      <p:grpSpPr>
+        <a:xfrm>
+          <a:off x="0" y="0"/>
+          <a:ext cx="0" cy="0"/>
+          <a:chOff x="0" y="0"/>
+          <a:chExt cx="0" cy="0"/>
+        </a:xfrm>
+      </p:grpSpPr>
+      <p:sp>
+        <p:nvSpPr>
+          <p:cNvPr id="2" name="Title 1"/>
+          <p:cNvSpPr>
+            <a:spLocks noGrp="1"/>
+          </p:cNvSpPr>
+          <p:nvPr>
+            <p:ph type="title"/>
+          </p:nvPr>
+        </p:nvSpPr>
+        <p:spPr/>
+        <p:txBody>
+          <a:bodyPr/>
+          <a:lstStyle/>
+          <a:p>
+            <a:r>
+              <a:rPr lang="en-US" smtClean="0"/>
+              <a:t>Click to edit Master title style</a:t>
+            </a:r>
+            <a:endParaRPr lang="it-IT"/>
+          </a:p>
+        </p:txBody>
+      </p:sp>
+      <p:sp>
+        <p:nvSpPr>
+          <p:cNvPr id="3" name="Date Placeholder 2"/>
+          <p:cNvSpPr>
+            <a:spLocks noGrp="1"/>
+          </p:cNvSpPr>
+          <p:nvPr>
+            <p:ph type="dt" sz="half" idx="10"/>
+          </p:nvPr>
+        </p:nvSpPr>
+        <p:spPr/>
+        <p:txBody>
+          <a:bodyPr/>
+          <a:lstStyle/>
+          <a:p>
+            <a:fld id="{1F56560B-483E-4A05-8895-70AE3E92A743}" type="datetimeFigureOut">
+              <a:rPr lang="it-IT">
+                <a:solidFill>
+                  <a:prstClr val="black">
+                    <a:tint val="75000"/>
+                  </a:prstClr>
+                </a:solidFill>
+              </a:rPr>
+              <a:pPr/>
+              <a:t>01/12/2015</a:t>
+            </a:fld>
+            <a:endParaRPr lang="it-IT">
+              <a:solidFill>
+                <a:prstClr val="black">
+                  <a:tint val="75000"/>
+                </a:prstClr>
+              </a:solidFill>
+            </a:endParaRPr>
+          </a:p>
+        </p:txBody>
+      </p:sp>
+      <p:sp>
+        <p:nvSpPr>
+          <p:cNvPr id="4" name="Footer Placeholder 3"/>
+          <p:cNvSpPr>
+            <a:spLocks noGrp="1"/>
+          </p:cNvSpPr>
+          <p:nvPr>
+            <p:ph type="ftr" sz="quarter" idx="11"/>
+          </p:nvPr>
+        </p:nvSpPr>
+        <p:spPr/>
+        <p:txBody>
+          <a:bodyPr/>
+          <a:lstStyle/>
+          <a:p>
+            <a:endParaRPr lang="it-IT">
+              <a:solidFill>
+                <a:prstClr val="black">
+                  <a:tint val="75000"/>
+                </a:prstClr>
+              </a:solidFill>
+            </a:endParaRPr>
+          </a:p>
+        </p:txBody>
+      </p:sp>
+      <p:sp>
+        <p:nvSpPr>
+          <p:cNvPr id="5" name="Slide Number Placeholder 4"/>
+          <p:cNvSpPr>
+            <a:spLocks noGrp="1"/>
+          </p:cNvSpPr>
+          <p:nvPr>
+            <p:ph type="sldNum" sz="quarter" idx="12"/>
+          </p:nvPr>
+        </p:nvSpPr>
+        <p:spPr/>
+        <p:txBody>
+          <a:bodyPr/>
+          <a:lstStyle/>
+          <a:p>
+            <a:fld id="{8C2BE814-DE07-4B1D-A7DA-665B27D573F8}" type="slidenum">
+              <a:rPr lang="it-IT">
+                <a:solidFill>
+                  <a:prstClr val="black">
+                    <a:tint val="75000"/>
+                  </a:prstClr>
+                </a:solidFill>
+              </a:rPr>
+              <a:pPr/>
+              <a:t>‹#›</a:t>
+            </a:fld>
+            <a:endParaRPr lang="it-IT">
+              <a:solidFill>
+                <a:prstClr val="black">
+                  <a:tint val="75000"/>
+                </a:prstClr>
+              </a:solidFill>
+            </a:endParaRPr>
+          </a:p>
+        </p:txBody>
+      </p:sp>
+    </p:spTree>
+    <p:extLst>
+      <p:ext uri="{BB962C8B-B14F-4D97-AF65-F5344CB8AC3E}">
+        <p14:creationId xmlns:p14="http://schemas.microsoft.com/office/powerpoint/2010/main" val="1203821294"/>
+      </p:ext>
+    </p:extLst>
+  </p:cSld>
+  <p:clrMapOvr>
+    <a:masterClrMapping/>
+  </p:clrMapOvr>
+</p:sldLayout>
+</file>
+
+<file path=ppt/slideLayouts/slideLayout18.xml><?xml version="1.0" encoding="utf-8"?>
+<p:sldLayout xmlns:a="http://schemas.openxmlformats.org/drawingml/2006/main" xmlns:r="http://schemas.openxmlformats.org/officeDocument/2006/relationships" xmlns:p="http://schemas.openxmlformats.org/presentationml/2006/main" type="blank" preserve="1">
+  <p:cSld name="Blank">
+    <p:spTree>
+      <p:nvGrpSpPr>
+        <p:cNvPr id="1" name=""/>
+        <p:cNvGrpSpPr/>
+        <p:nvPr/>
+      </p:nvGrpSpPr>
+      <p:grpSpPr>
+        <a:xfrm>
+          <a:off x="0" y="0"/>
+          <a:ext cx="0" cy="0"/>
+          <a:chOff x="0" y="0"/>
+          <a:chExt cx="0" cy="0"/>
+        </a:xfrm>
+      </p:grpSpPr>
+      <p:sp>
+        <p:nvSpPr>
+          <p:cNvPr id="2" name="Date Placeholder 1"/>
+          <p:cNvSpPr>
+            <a:spLocks noGrp="1"/>
+          </p:cNvSpPr>
+          <p:nvPr>
+            <p:ph type="dt" sz="half" idx="10"/>
+          </p:nvPr>
+        </p:nvSpPr>
+        <p:spPr/>
+        <p:txBody>
+          <a:bodyPr/>
+          <a:lstStyle/>
+          <a:p>
+            <a:fld id="{1F56560B-483E-4A05-8895-70AE3E92A743}" type="datetimeFigureOut">
+              <a:rPr lang="it-IT">
+                <a:solidFill>
+                  <a:prstClr val="black">
+                    <a:tint val="75000"/>
+                  </a:prstClr>
+                </a:solidFill>
+              </a:rPr>
+              <a:pPr/>
+              <a:t>01/12/2015</a:t>
+            </a:fld>
+            <a:endParaRPr lang="it-IT">
+              <a:solidFill>
+                <a:prstClr val="black">
+                  <a:tint val="75000"/>
+                </a:prstClr>
+              </a:solidFill>
+            </a:endParaRPr>
+          </a:p>
+        </p:txBody>
+      </p:sp>
+      <p:sp>
+        <p:nvSpPr>
+          <p:cNvPr id="3" name="Footer Placeholder 2"/>
+          <p:cNvSpPr>
+            <a:spLocks noGrp="1"/>
+          </p:cNvSpPr>
+          <p:nvPr>
+            <p:ph type="ftr" sz="quarter" idx="11"/>
+          </p:nvPr>
+        </p:nvSpPr>
+        <p:spPr/>
+        <p:txBody>
+          <a:bodyPr/>
+          <a:lstStyle/>
+          <a:p>
+            <a:endParaRPr lang="it-IT">
+              <a:solidFill>
+                <a:prstClr val="black">
+                  <a:tint val="75000"/>
+                </a:prstClr>
+              </a:solidFill>
+            </a:endParaRPr>
+          </a:p>
+        </p:txBody>
+      </p:sp>
+      <p:sp>
+        <p:nvSpPr>
+          <p:cNvPr id="4" name="Slide Number Placeholder 3"/>
+          <p:cNvSpPr>
+            <a:spLocks noGrp="1"/>
+          </p:cNvSpPr>
+          <p:nvPr>
+            <p:ph type="sldNum" sz="quarter" idx="12"/>
+          </p:nvPr>
+        </p:nvSpPr>
+        <p:spPr/>
+        <p:txBody>
+          <a:bodyPr/>
+          <a:lstStyle/>
+          <a:p>
+            <a:fld id="{8C2BE814-DE07-4B1D-A7DA-665B27D573F8}" type="slidenum">
+              <a:rPr lang="it-IT">
+                <a:solidFill>
+                  <a:prstClr val="black">
+                    <a:tint val="75000"/>
+                  </a:prstClr>
+                </a:solidFill>
+              </a:rPr>
+              <a:pPr/>
+              <a:t>‹#›</a:t>
+            </a:fld>
+            <a:endParaRPr lang="it-IT">
+              <a:solidFill>
+                <a:prstClr val="black">
+                  <a:tint val="75000"/>
+                </a:prstClr>
+              </a:solidFill>
+            </a:endParaRPr>
+          </a:p>
+        </p:txBody>
+      </p:sp>
+    </p:spTree>
+    <p:extLst>
+      <p:ext uri="{BB962C8B-B14F-4D97-AF65-F5344CB8AC3E}">
+        <p14:creationId xmlns:p14="http://schemas.microsoft.com/office/powerpoint/2010/main" val="697074368"/>
+      </p:ext>
+    </p:extLst>
+  </p:cSld>
+  <p:clrMapOvr>
+    <a:masterClrMapping/>
+  </p:clrMapOvr>
+</p:sldLayout>
+</file>
+
+<file path=ppt/slideLayouts/slideLayout19.xml><?xml version="1.0" encoding="utf-8"?>
+<p:sldLayout xmlns:a="http://schemas.openxmlformats.org/drawingml/2006/main" xmlns:r="http://schemas.openxmlformats.org/officeDocument/2006/relationships" xmlns:p="http://schemas.openxmlformats.org/presentationml/2006/main" type="objTx" preserve="1">
+  <p:cSld name="Content with Caption">
+    <p:spTree>
+      <p:nvGrpSpPr>
+        <p:cNvPr id="1" name=""/>
+        <p:cNvGrpSpPr/>
+        <p:nvPr/>
+      </p:nvGrpSpPr>
+      <p:grpSpPr>
+        <a:xfrm>
+          <a:off x="0" y="0"/>
+          <a:ext cx="0" cy="0"/>
+          <a:chOff x="0" y="0"/>
+          <a:chExt cx="0" cy="0"/>
+        </a:xfrm>
+      </p:grpSpPr>
+      <p:sp>
+        <p:nvSpPr>
+          <p:cNvPr id="2" name="Title 1"/>
+          <p:cNvSpPr>
+            <a:spLocks noGrp="1"/>
+          </p:cNvSpPr>
+          <p:nvPr>
+            <p:ph type="title"/>
+          </p:nvPr>
+        </p:nvSpPr>
+        <p:spPr>
+          <a:xfrm>
+            <a:off x="839788" y="457200"/>
+            <a:ext cx="3932237" cy="1600200"/>
+          </a:xfrm>
+        </p:spPr>
+        <p:txBody>
+          <a:bodyPr anchor="b"/>
+          <a:lstStyle>
+            <a:lvl1pPr>
+              <a:defRPr sz="3200"/>
+            </a:lvl1pPr>
+          </a:lstStyle>
+          <a:p>
+            <a:r>
+              <a:rPr lang="en-US" smtClean="0"/>
+              <a:t>Click to edit Master title style</a:t>
+            </a:r>
+            <a:endParaRPr lang="it-IT"/>
+          </a:p>
+        </p:txBody>
+      </p:sp>
+      <p:sp>
+        <p:nvSpPr>
+          <p:cNvPr id="3" name="Content Placeholder 2"/>
+          <p:cNvSpPr>
+            <a:spLocks noGrp="1"/>
+          </p:cNvSpPr>
+          <p:nvPr>
+            <p:ph idx="1"/>
+          </p:nvPr>
+        </p:nvSpPr>
+        <p:spPr>
+          <a:xfrm>
+            <a:off x="5183188" y="987425"/>
+            <a:ext cx="6172200" cy="4873625"/>
+          </a:xfrm>
+        </p:spPr>
+        <p:txBody>
+          <a:bodyPr/>
+          <a:lstStyle>
+            <a:lvl1pPr>
+              <a:defRPr sz="3200"/>
+            </a:lvl1pPr>
+            <a:lvl2pPr>
+              <a:defRPr sz="2800"/>
+            </a:lvl2pPr>
+            <a:lvl3pPr>
+              <a:defRPr sz="2400"/>
+            </a:lvl3pPr>
+            <a:lvl4pPr>
+              <a:defRPr sz="2000"/>
+            </a:lvl4pPr>
+            <a:lvl5pPr>
+              <a:defRPr sz="2000"/>
+            </a:lvl5pPr>
+            <a:lvl6pPr>
+              <a:defRPr sz="2000"/>
+            </a:lvl6pPr>
+            <a:lvl7pPr>
+              <a:defRPr sz="2000"/>
+            </a:lvl7pPr>
+            <a:lvl8pPr>
+              <a:defRPr sz="2000"/>
+            </a:lvl8pPr>
+            <a:lvl9pPr>
+              <a:defRPr sz="2000"/>
+            </a:lvl9pPr>
+          </a:lstStyle>
+          <a:p>
+            <a:pPr lvl="0"/>
+            <a:r>
+              <a:rPr lang="en-US" smtClean="0"/>
+              <a:t>Click to edit Master text styles</a:t>
+            </a:r>
+          </a:p>
+          <a:p>
+            <a:pPr lvl="1"/>
+            <a:r>
+              <a:rPr lang="en-US" smtClean="0"/>
+              <a:t>Second level</a:t>
+            </a:r>
+          </a:p>
+          <a:p>
+            <a:pPr lvl="2"/>
+            <a:r>
+              <a:rPr lang="en-US" smtClean="0"/>
+              <a:t>Third level</a:t>
+            </a:r>
+          </a:p>
+          <a:p>
+            <a:pPr lvl="3"/>
+            <a:r>
+              <a:rPr lang="en-US" smtClean="0"/>
+              <a:t>Fourth level</a:t>
+            </a:r>
+          </a:p>
+          <a:p>
+            <a:pPr lvl="4"/>
+            <a:r>
+              <a:rPr lang="en-US" smtClean="0"/>
+              <a:t>Fifth level</a:t>
+            </a:r>
+            <a:endParaRPr lang="it-IT"/>
+          </a:p>
+        </p:txBody>
+      </p:sp>
+      <p:sp>
+        <p:nvSpPr>
+          <p:cNvPr id="4" name="Text Placeholder 3"/>
+          <p:cNvSpPr>
+            <a:spLocks noGrp="1"/>
+          </p:cNvSpPr>
+          <p:nvPr>
+            <p:ph type="body" sz="half" idx="2"/>
+          </p:nvPr>
+        </p:nvSpPr>
+        <p:spPr>
+          <a:xfrm>
+            <a:off x="839788" y="2057400"/>
+            <a:ext cx="3932237" cy="3811588"/>
+          </a:xfrm>
+        </p:spPr>
+        <p:txBody>
+          <a:bodyPr/>
+          <a:lstStyle>
+            <a:lvl1pPr marL="0" indent="0">
+              <a:buNone/>
+              <a:defRPr sz="1600"/>
+            </a:lvl1pPr>
+            <a:lvl2pPr marL="457200" indent="0">
+              <a:buNone/>
+              <a:defRPr sz="1400"/>
+            </a:lvl2pPr>
+            <a:lvl3pPr marL="914400" indent="0">
+              <a:buNone/>
+              <a:defRPr sz="1200"/>
+            </a:lvl3pPr>
+            <a:lvl4pPr marL="1371600" indent="0">
+              <a:buNone/>
+              <a:defRPr sz="1000"/>
+            </a:lvl4pPr>
+            <a:lvl5pPr marL="1828800" indent="0">
+              <a:buNone/>
+              <a:defRPr sz="1000"/>
+            </a:lvl5pPr>
+            <a:lvl6pPr marL="2286000" indent="0">
+              <a:buNone/>
+              <a:defRPr sz="1000"/>
+            </a:lvl6pPr>
+            <a:lvl7pPr marL="2743200" indent="0">
+              <a:buNone/>
+              <a:defRPr sz="1000"/>
+            </a:lvl7pPr>
+            <a:lvl8pPr marL="3200400" indent="0">
+              <a:buNone/>
+              <a:defRPr sz="1000"/>
+            </a:lvl8pPr>
+            <a:lvl9pPr marL="3657600" indent="0">
+              <a:buNone/>
+              <a:defRPr sz="1000"/>
+            </a:lvl9pPr>
+          </a:lstStyle>
+          <a:p>
+            <a:pPr lvl="0"/>
+            <a:r>
+              <a:rPr lang="en-US" smtClean="0"/>
+              <a:t>Click to edit Master text styles</a:t>
+            </a:r>
+          </a:p>
+        </p:txBody>
+      </p:sp>
+      <p:sp>
+        <p:nvSpPr>
+          <p:cNvPr id="5" name="Date Placeholder 4"/>
+          <p:cNvSpPr>
+            <a:spLocks noGrp="1"/>
+          </p:cNvSpPr>
+          <p:nvPr>
+            <p:ph type="dt" sz="half" idx="10"/>
+          </p:nvPr>
+        </p:nvSpPr>
+        <p:spPr/>
+        <p:txBody>
+          <a:bodyPr/>
+          <a:lstStyle/>
+          <a:p>
+            <a:fld id="{1F56560B-483E-4A05-8895-70AE3E92A743}" type="datetimeFigureOut">
+              <a:rPr lang="it-IT">
+                <a:solidFill>
+                  <a:prstClr val="black">
+                    <a:tint val="75000"/>
+                  </a:prstClr>
+                </a:solidFill>
+              </a:rPr>
+              <a:pPr/>
+              <a:t>01/12/2015</a:t>
+            </a:fld>
+            <a:endParaRPr lang="it-IT">
+              <a:solidFill>
+                <a:prstClr val="black">
+                  <a:tint val="75000"/>
+                </a:prstClr>
+              </a:solidFill>
+            </a:endParaRPr>
+          </a:p>
+        </p:txBody>
+      </p:sp>
+      <p:sp>
+        <p:nvSpPr>
+          <p:cNvPr id="6" name="Footer Placeholder 5"/>
+          <p:cNvSpPr>
+            <a:spLocks noGrp="1"/>
+          </p:cNvSpPr>
+          <p:nvPr>
+            <p:ph type="ftr" sz="quarter" idx="11"/>
+          </p:nvPr>
+        </p:nvSpPr>
+        <p:spPr/>
+        <p:txBody>
+          <a:bodyPr/>
+          <a:lstStyle/>
+          <a:p>
+            <a:endParaRPr lang="it-IT">
+              <a:solidFill>
+                <a:prstClr val="black">
+                  <a:tint val="75000"/>
+                </a:prstClr>
+              </a:solidFill>
+            </a:endParaRPr>
+          </a:p>
+        </p:txBody>
+      </p:sp>
+      <p:sp>
+        <p:nvSpPr>
+          <p:cNvPr id="7" name="Slide Number Placeholder 6"/>
+          <p:cNvSpPr>
+            <a:spLocks noGrp="1"/>
+          </p:cNvSpPr>
+          <p:nvPr>
+            <p:ph type="sldNum" sz="quarter" idx="12"/>
+          </p:nvPr>
+        </p:nvSpPr>
+        <p:spPr/>
+        <p:txBody>
+          <a:bodyPr/>
+          <a:lstStyle/>
+          <a:p>
+            <a:fld id="{8C2BE814-DE07-4B1D-A7DA-665B27D573F8}" type="slidenum">
+              <a:rPr lang="it-IT">
+                <a:solidFill>
+                  <a:prstClr val="black">
+                    <a:tint val="75000"/>
+                  </a:prstClr>
+                </a:solidFill>
+              </a:rPr>
+              <a:pPr/>
+              <a:t>‹#›</a:t>
+            </a:fld>
+            <a:endParaRPr lang="it-IT">
+              <a:solidFill>
+                <a:prstClr val="black">
+                  <a:tint val="75000"/>
+                </a:prstClr>
+              </a:solidFill>
+            </a:endParaRPr>
+          </a:p>
+        </p:txBody>
+      </p:sp>
+    </p:spTree>
+    <p:extLst>
+      <p:ext uri="{BB962C8B-B14F-4D97-AF65-F5344CB8AC3E}">
+        <p14:creationId xmlns:p14="http://schemas.microsoft.com/office/powerpoint/2010/main" val="1797264374"/>
       </p:ext>
     </p:extLst>
   </p:cSld>
@@ -763,7 +2718,7 @@
           <a:p>
             <a:fld id="{BE9E4639-3C3E-4B8B-BDFD-ECAC4CBC4975}" type="datetimeFigureOut">
               <a:rPr lang="it-IT" smtClean="0"/>
-              <a:t>29/11/2015</a:t>
+              <a:t>01/12/2015</a:t>
             </a:fld>
             <a:endParaRPr lang="it-IT"/>
           </a:p>
@@ -815,6 +2770,705 @@
     <p:extLst>
       <p:ext uri="{BB962C8B-B14F-4D97-AF65-F5344CB8AC3E}">
         <p14:creationId xmlns:p14="http://schemas.microsoft.com/office/powerpoint/2010/main" val="3020063101"/>
+      </p:ext>
+    </p:extLst>
+  </p:cSld>
+  <p:clrMapOvr>
+    <a:masterClrMapping/>
+  </p:clrMapOvr>
+</p:sldLayout>
+</file>
+
+<file path=ppt/slideLayouts/slideLayout20.xml><?xml version="1.0" encoding="utf-8"?>
+<p:sldLayout xmlns:a="http://schemas.openxmlformats.org/drawingml/2006/main" xmlns:r="http://schemas.openxmlformats.org/officeDocument/2006/relationships" xmlns:p="http://schemas.openxmlformats.org/presentationml/2006/main" type="picTx" preserve="1">
+  <p:cSld name="Picture with Caption">
+    <p:spTree>
+      <p:nvGrpSpPr>
+        <p:cNvPr id="1" name=""/>
+        <p:cNvGrpSpPr/>
+        <p:nvPr/>
+      </p:nvGrpSpPr>
+      <p:grpSpPr>
+        <a:xfrm>
+          <a:off x="0" y="0"/>
+          <a:ext cx="0" cy="0"/>
+          <a:chOff x="0" y="0"/>
+          <a:chExt cx="0" cy="0"/>
+        </a:xfrm>
+      </p:grpSpPr>
+      <p:sp>
+        <p:nvSpPr>
+          <p:cNvPr id="2" name="Title 1"/>
+          <p:cNvSpPr>
+            <a:spLocks noGrp="1"/>
+          </p:cNvSpPr>
+          <p:nvPr>
+            <p:ph type="title"/>
+          </p:nvPr>
+        </p:nvSpPr>
+        <p:spPr>
+          <a:xfrm>
+            <a:off x="839788" y="457200"/>
+            <a:ext cx="3932237" cy="1600200"/>
+          </a:xfrm>
+        </p:spPr>
+        <p:txBody>
+          <a:bodyPr anchor="b"/>
+          <a:lstStyle>
+            <a:lvl1pPr>
+              <a:defRPr sz="3200"/>
+            </a:lvl1pPr>
+          </a:lstStyle>
+          <a:p>
+            <a:r>
+              <a:rPr lang="en-US" smtClean="0"/>
+              <a:t>Click to edit Master title style</a:t>
+            </a:r>
+            <a:endParaRPr lang="it-IT"/>
+          </a:p>
+        </p:txBody>
+      </p:sp>
+      <p:sp>
+        <p:nvSpPr>
+          <p:cNvPr id="3" name="Picture Placeholder 2"/>
+          <p:cNvSpPr>
+            <a:spLocks noGrp="1"/>
+          </p:cNvSpPr>
+          <p:nvPr>
+            <p:ph type="pic" idx="1"/>
+          </p:nvPr>
+        </p:nvSpPr>
+        <p:spPr>
+          <a:xfrm>
+            <a:off x="5183188" y="987425"/>
+            <a:ext cx="6172200" cy="4873625"/>
+          </a:xfrm>
+        </p:spPr>
+        <p:txBody>
+          <a:bodyPr/>
+          <a:lstStyle>
+            <a:lvl1pPr marL="0" indent="0">
+              <a:buNone/>
+              <a:defRPr sz="3200"/>
+            </a:lvl1pPr>
+            <a:lvl2pPr marL="457200" indent="0">
+              <a:buNone/>
+              <a:defRPr sz="2800"/>
+            </a:lvl2pPr>
+            <a:lvl3pPr marL="914400" indent="0">
+              <a:buNone/>
+              <a:defRPr sz="2400"/>
+            </a:lvl3pPr>
+            <a:lvl4pPr marL="1371600" indent="0">
+              <a:buNone/>
+              <a:defRPr sz="2000"/>
+            </a:lvl4pPr>
+            <a:lvl5pPr marL="1828800" indent="0">
+              <a:buNone/>
+              <a:defRPr sz="2000"/>
+            </a:lvl5pPr>
+            <a:lvl6pPr marL="2286000" indent="0">
+              <a:buNone/>
+              <a:defRPr sz="2000"/>
+            </a:lvl6pPr>
+            <a:lvl7pPr marL="2743200" indent="0">
+              <a:buNone/>
+              <a:defRPr sz="2000"/>
+            </a:lvl7pPr>
+            <a:lvl8pPr marL="3200400" indent="0">
+              <a:buNone/>
+              <a:defRPr sz="2000"/>
+            </a:lvl8pPr>
+            <a:lvl9pPr marL="3657600" indent="0">
+              <a:buNone/>
+              <a:defRPr sz="2000"/>
+            </a:lvl9pPr>
+          </a:lstStyle>
+          <a:p>
+            <a:endParaRPr lang="it-IT"/>
+          </a:p>
+        </p:txBody>
+      </p:sp>
+      <p:sp>
+        <p:nvSpPr>
+          <p:cNvPr id="4" name="Text Placeholder 3"/>
+          <p:cNvSpPr>
+            <a:spLocks noGrp="1"/>
+          </p:cNvSpPr>
+          <p:nvPr>
+            <p:ph type="body" sz="half" idx="2"/>
+          </p:nvPr>
+        </p:nvSpPr>
+        <p:spPr>
+          <a:xfrm>
+            <a:off x="839788" y="2057400"/>
+            <a:ext cx="3932237" cy="3811588"/>
+          </a:xfrm>
+        </p:spPr>
+        <p:txBody>
+          <a:bodyPr/>
+          <a:lstStyle>
+            <a:lvl1pPr marL="0" indent="0">
+              <a:buNone/>
+              <a:defRPr sz="1600"/>
+            </a:lvl1pPr>
+            <a:lvl2pPr marL="457200" indent="0">
+              <a:buNone/>
+              <a:defRPr sz="1400"/>
+            </a:lvl2pPr>
+            <a:lvl3pPr marL="914400" indent="0">
+              <a:buNone/>
+              <a:defRPr sz="1200"/>
+            </a:lvl3pPr>
+            <a:lvl4pPr marL="1371600" indent="0">
+              <a:buNone/>
+              <a:defRPr sz="1000"/>
+            </a:lvl4pPr>
+            <a:lvl5pPr marL="1828800" indent="0">
+              <a:buNone/>
+              <a:defRPr sz="1000"/>
+            </a:lvl5pPr>
+            <a:lvl6pPr marL="2286000" indent="0">
+              <a:buNone/>
+              <a:defRPr sz="1000"/>
+            </a:lvl6pPr>
+            <a:lvl7pPr marL="2743200" indent="0">
+              <a:buNone/>
+              <a:defRPr sz="1000"/>
+            </a:lvl7pPr>
+            <a:lvl8pPr marL="3200400" indent="0">
+              <a:buNone/>
+              <a:defRPr sz="1000"/>
+            </a:lvl8pPr>
+            <a:lvl9pPr marL="3657600" indent="0">
+              <a:buNone/>
+              <a:defRPr sz="1000"/>
+            </a:lvl9pPr>
+          </a:lstStyle>
+          <a:p>
+            <a:pPr lvl="0"/>
+            <a:r>
+              <a:rPr lang="en-US" smtClean="0"/>
+              <a:t>Click to edit Master text styles</a:t>
+            </a:r>
+          </a:p>
+        </p:txBody>
+      </p:sp>
+      <p:sp>
+        <p:nvSpPr>
+          <p:cNvPr id="5" name="Date Placeholder 4"/>
+          <p:cNvSpPr>
+            <a:spLocks noGrp="1"/>
+          </p:cNvSpPr>
+          <p:nvPr>
+            <p:ph type="dt" sz="half" idx="10"/>
+          </p:nvPr>
+        </p:nvSpPr>
+        <p:spPr/>
+        <p:txBody>
+          <a:bodyPr/>
+          <a:lstStyle/>
+          <a:p>
+            <a:fld id="{1F56560B-483E-4A05-8895-70AE3E92A743}" type="datetimeFigureOut">
+              <a:rPr lang="it-IT">
+                <a:solidFill>
+                  <a:prstClr val="black">
+                    <a:tint val="75000"/>
+                  </a:prstClr>
+                </a:solidFill>
+              </a:rPr>
+              <a:pPr/>
+              <a:t>01/12/2015</a:t>
+            </a:fld>
+            <a:endParaRPr lang="it-IT">
+              <a:solidFill>
+                <a:prstClr val="black">
+                  <a:tint val="75000"/>
+                </a:prstClr>
+              </a:solidFill>
+            </a:endParaRPr>
+          </a:p>
+        </p:txBody>
+      </p:sp>
+      <p:sp>
+        <p:nvSpPr>
+          <p:cNvPr id="6" name="Footer Placeholder 5"/>
+          <p:cNvSpPr>
+            <a:spLocks noGrp="1"/>
+          </p:cNvSpPr>
+          <p:nvPr>
+            <p:ph type="ftr" sz="quarter" idx="11"/>
+          </p:nvPr>
+        </p:nvSpPr>
+        <p:spPr/>
+        <p:txBody>
+          <a:bodyPr/>
+          <a:lstStyle/>
+          <a:p>
+            <a:endParaRPr lang="it-IT">
+              <a:solidFill>
+                <a:prstClr val="black">
+                  <a:tint val="75000"/>
+                </a:prstClr>
+              </a:solidFill>
+            </a:endParaRPr>
+          </a:p>
+        </p:txBody>
+      </p:sp>
+      <p:sp>
+        <p:nvSpPr>
+          <p:cNvPr id="7" name="Slide Number Placeholder 6"/>
+          <p:cNvSpPr>
+            <a:spLocks noGrp="1"/>
+          </p:cNvSpPr>
+          <p:nvPr>
+            <p:ph type="sldNum" sz="quarter" idx="12"/>
+          </p:nvPr>
+        </p:nvSpPr>
+        <p:spPr/>
+        <p:txBody>
+          <a:bodyPr/>
+          <a:lstStyle/>
+          <a:p>
+            <a:fld id="{8C2BE814-DE07-4B1D-A7DA-665B27D573F8}" type="slidenum">
+              <a:rPr lang="it-IT">
+                <a:solidFill>
+                  <a:prstClr val="black">
+                    <a:tint val="75000"/>
+                  </a:prstClr>
+                </a:solidFill>
+              </a:rPr>
+              <a:pPr/>
+              <a:t>‹#›</a:t>
+            </a:fld>
+            <a:endParaRPr lang="it-IT">
+              <a:solidFill>
+                <a:prstClr val="black">
+                  <a:tint val="75000"/>
+                </a:prstClr>
+              </a:solidFill>
+            </a:endParaRPr>
+          </a:p>
+        </p:txBody>
+      </p:sp>
+    </p:spTree>
+    <p:extLst>
+      <p:ext uri="{BB962C8B-B14F-4D97-AF65-F5344CB8AC3E}">
+        <p14:creationId xmlns:p14="http://schemas.microsoft.com/office/powerpoint/2010/main" val="826548709"/>
+      </p:ext>
+    </p:extLst>
+  </p:cSld>
+  <p:clrMapOvr>
+    <a:masterClrMapping/>
+  </p:clrMapOvr>
+</p:sldLayout>
+</file>
+
+<file path=ppt/slideLayouts/slideLayout21.xml><?xml version="1.0" encoding="utf-8"?>
+<p:sldLayout xmlns:a="http://schemas.openxmlformats.org/drawingml/2006/main" xmlns:r="http://schemas.openxmlformats.org/officeDocument/2006/relationships" xmlns:p="http://schemas.openxmlformats.org/presentationml/2006/main" type="vertTx" preserve="1">
+  <p:cSld name="Title and Vertical Text">
+    <p:spTree>
+      <p:nvGrpSpPr>
+        <p:cNvPr id="1" name=""/>
+        <p:cNvGrpSpPr/>
+        <p:nvPr/>
+      </p:nvGrpSpPr>
+      <p:grpSpPr>
+        <a:xfrm>
+          <a:off x="0" y="0"/>
+          <a:ext cx="0" cy="0"/>
+          <a:chOff x="0" y="0"/>
+          <a:chExt cx="0" cy="0"/>
+        </a:xfrm>
+      </p:grpSpPr>
+      <p:sp>
+        <p:nvSpPr>
+          <p:cNvPr id="2" name="Title 1"/>
+          <p:cNvSpPr>
+            <a:spLocks noGrp="1"/>
+          </p:cNvSpPr>
+          <p:nvPr>
+            <p:ph type="title"/>
+          </p:nvPr>
+        </p:nvSpPr>
+        <p:spPr/>
+        <p:txBody>
+          <a:bodyPr/>
+          <a:lstStyle/>
+          <a:p>
+            <a:r>
+              <a:rPr lang="en-US" smtClean="0"/>
+              <a:t>Click to edit Master title style</a:t>
+            </a:r>
+            <a:endParaRPr lang="it-IT"/>
+          </a:p>
+        </p:txBody>
+      </p:sp>
+      <p:sp>
+        <p:nvSpPr>
+          <p:cNvPr id="3" name="Vertical Text Placeholder 2"/>
+          <p:cNvSpPr>
+            <a:spLocks noGrp="1"/>
+          </p:cNvSpPr>
+          <p:nvPr>
+            <p:ph type="body" orient="vert" idx="1"/>
+          </p:nvPr>
+        </p:nvSpPr>
+        <p:spPr/>
+        <p:txBody>
+          <a:bodyPr vert="eaVert"/>
+          <a:lstStyle/>
+          <a:p>
+            <a:pPr lvl="0"/>
+            <a:r>
+              <a:rPr lang="en-US" smtClean="0"/>
+              <a:t>Click to edit Master text styles</a:t>
+            </a:r>
+          </a:p>
+          <a:p>
+            <a:pPr lvl="1"/>
+            <a:r>
+              <a:rPr lang="en-US" smtClean="0"/>
+              <a:t>Second level</a:t>
+            </a:r>
+          </a:p>
+          <a:p>
+            <a:pPr lvl="2"/>
+            <a:r>
+              <a:rPr lang="en-US" smtClean="0"/>
+              <a:t>Third level</a:t>
+            </a:r>
+          </a:p>
+          <a:p>
+            <a:pPr lvl="3"/>
+            <a:r>
+              <a:rPr lang="en-US" smtClean="0"/>
+              <a:t>Fourth level</a:t>
+            </a:r>
+          </a:p>
+          <a:p>
+            <a:pPr lvl="4"/>
+            <a:r>
+              <a:rPr lang="en-US" smtClean="0"/>
+              <a:t>Fifth level</a:t>
+            </a:r>
+            <a:endParaRPr lang="it-IT"/>
+          </a:p>
+        </p:txBody>
+      </p:sp>
+      <p:sp>
+        <p:nvSpPr>
+          <p:cNvPr id="4" name="Date Placeholder 3"/>
+          <p:cNvSpPr>
+            <a:spLocks noGrp="1"/>
+          </p:cNvSpPr>
+          <p:nvPr>
+            <p:ph type="dt" sz="half" idx="10"/>
+          </p:nvPr>
+        </p:nvSpPr>
+        <p:spPr/>
+        <p:txBody>
+          <a:bodyPr/>
+          <a:lstStyle/>
+          <a:p>
+            <a:fld id="{1F56560B-483E-4A05-8895-70AE3E92A743}" type="datetimeFigureOut">
+              <a:rPr lang="it-IT">
+                <a:solidFill>
+                  <a:prstClr val="black">
+                    <a:tint val="75000"/>
+                  </a:prstClr>
+                </a:solidFill>
+              </a:rPr>
+              <a:pPr/>
+              <a:t>01/12/2015</a:t>
+            </a:fld>
+            <a:endParaRPr lang="it-IT">
+              <a:solidFill>
+                <a:prstClr val="black">
+                  <a:tint val="75000"/>
+                </a:prstClr>
+              </a:solidFill>
+            </a:endParaRPr>
+          </a:p>
+        </p:txBody>
+      </p:sp>
+      <p:sp>
+        <p:nvSpPr>
+          <p:cNvPr id="5" name="Footer Placeholder 4"/>
+          <p:cNvSpPr>
+            <a:spLocks noGrp="1"/>
+          </p:cNvSpPr>
+          <p:nvPr>
+            <p:ph type="ftr" sz="quarter" idx="11"/>
+          </p:nvPr>
+        </p:nvSpPr>
+        <p:spPr/>
+        <p:txBody>
+          <a:bodyPr/>
+          <a:lstStyle/>
+          <a:p>
+            <a:endParaRPr lang="it-IT">
+              <a:solidFill>
+                <a:prstClr val="black">
+                  <a:tint val="75000"/>
+                </a:prstClr>
+              </a:solidFill>
+            </a:endParaRPr>
+          </a:p>
+        </p:txBody>
+      </p:sp>
+      <p:sp>
+        <p:nvSpPr>
+          <p:cNvPr id="6" name="Slide Number Placeholder 5"/>
+          <p:cNvSpPr>
+            <a:spLocks noGrp="1"/>
+          </p:cNvSpPr>
+          <p:nvPr>
+            <p:ph type="sldNum" sz="quarter" idx="12"/>
+          </p:nvPr>
+        </p:nvSpPr>
+        <p:spPr/>
+        <p:txBody>
+          <a:bodyPr/>
+          <a:lstStyle/>
+          <a:p>
+            <a:fld id="{8C2BE814-DE07-4B1D-A7DA-665B27D573F8}" type="slidenum">
+              <a:rPr lang="it-IT">
+                <a:solidFill>
+                  <a:prstClr val="black">
+                    <a:tint val="75000"/>
+                  </a:prstClr>
+                </a:solidFill>
+              </a:rPr>
+              <a:pPr/>
+              <a:t>‹#›</a:t>
+            </a:fld>
+            <a:endParaRPr lang="it-IT">
+              <a:solidFill>
+                <a:prstClr val="black">
+                  <a:tint val="75000"/>
+                </a:prstClr>
+              </a:solidFill>
+            </a:endParaRPr>
+          </a:p>
+        </p:txBody>
+      </p:sp>
+    </p:spTree>
+    <p:extLst>
+      <p:ext uri="{BB962C8B-B14F-4D97-AF65-F5344CB8AC3E}">
+        <p14:creationId xmlns:p14="http://schemas.microsoft.com/office/powerpoint/2010/main" val="3271306170"/>
+      </p:ext>
+    </p:extLst>
+  </p:cSld>
+  <p:clrMapOvr>
+    <a:masterClrMapping/>
+  </p:clrMapOvr>
+</p:sldLayout>
+</file>
+
+<file path=ppt/slideLayouts/slideLayout22.xml><?xml version="1.0" encoding="utf-8"?>
+<p:sldLayout xmlns:a="http://schemas.openxmlformats.org/drawingml/2006/main" xmlns:r="http://schemas.openxmlformats.org/officeDocument/2006/relationships" xmlns:p="http://schemas.openxmlformats.org/presentationml/2006/main" type="vertTitleAndTx" preserve="1">
+  <p:cSld name="Vertical Title and Text">
+    <p:spTree>
+      <p:nvGrpSpPr>
+        <p:cNvPr id="1" name=""/>
+        <p:cNvGrpSpPr/>
+        <p:nvPr/>
+      </p:nvGrpSpPr>
+      <p:grpSpPr>
+        <a:xfrm>
+          <a:off x="0" y="0"/>
+          <a:ext cx="0" cy="0"/>
+          <a:chOff x="0" y="0"/>
+          <a:chExt cx="0" cy="0"/>
+        </a:xfrm>
+      </p:grpSpPr>
+      <p:sp>
+        <p:nvSpPr>
+          <p:cNvPr id="2" name="Vertical Title 1"/>
+          <p:cNvSpPr>
+            <a:spLocks noGrp="1"/>
+          </p:cNvSpPr>
+          <p:nvPr>
+            <p:ph type="title" orient="vert"/>
+          </p:nvPr>
+        </p:nvSpPr>
+        <p:spPr>
+          <a:xfrm>
+            <a:off x="8724900" y="365125"/>
+            <a:ext cx="2628900" cy="5811838"/>
+          </a:xfrm>
+        </p:spPr>
+        <p:txBody>
+          <a:bodyPr vert="eaVert"/>
+          <a:lstStyle/>
+          <a:p>
+            <a:r>
+              <a:rPr lang="en-US" smtClean="0"/>
+              <a:t>Click to edit Master title style</a:t>
+            </a:r>
+            <a:endParaRPr lang="it-IT"/>
+          </a:p>
+        </p:txBody>
+      </p:sp>
+      <p:sp>
+        <p:nvSpPr>
+          <p:cNvPr id="3" name="Vertical Text Placeholder 2"/>
+          <p:cNvSpPr>
+            <a:spLocks noGrp="1"/>
+          </p:cNvSpPr>
+          <p:nvPr>
+            <p:ph type="body" orient="vert" idx="1"/>
+          </p:nvPr>
+        </p:nvSpPr>
+        <p:spPr>
+          <a:xfrm>
+            <a:off x="838200" y="365125"/>
+            <a:ext cx="7734300" cy="5811838"/>
+          </a:xfrm>
+        </p:spPr>
+        <p:txBody>
+          <a:bodyPr vert="eaVert"/>
+          <a:lstStyle/>
+          <a:p>
+            <a:pPr lvl="0"/>
+            <a:r>
+              <a:rPr lang="en-US" smtClean="0"/>
+              <a:t>Click to edit Master text styles</a:t>
+            </a:r>
+          </a:p>
+          <a:p>
+            <a:pPr lvl="1"/>
+            <a:r>
+              <a:rPr lang="en-US" smtClean="0"/>
+              <a:t>Second level</a:t>
+            </a:r>
+          </a:p>
+          <a:p>
+            <a:pPr lvl="2"/>
+            <a:r>
+              <a:rPr lang="en-US" smtClean="0"/>
+              <a:t>Third level</a:t>
+            </a:r>
+          </a:p>
+          <a:p>
+            <a:pPr lvl="3"/>
+            <a:r>
+              <a:rPr lang="en-US" smtClean="0"/>
+              <a:t>Fourth level</a:t>
+            </a:r>
+          </a:p>
+          <a:p>
+            <a:pPr lvl="4"/>
+            <a:r>
+              <a:rPr lang="en-US" smtClean="0"/>
+              <a:t>Fifth level</a:t>
+            </a:r>
+            <a:endParaRPr lang="it-IT"/>
+          </a:p>
+        </p:txBody>
+      </p:sp>
+      <p:sp>
+        <p:nvSpPr>
+          <p:cNvPr id="4" name="Date Placeholder 3"/>
+          <p:cNvSpPr>
+            <a:spLocks noGrp="1"/>
+          </p:cNvSpPr>
+          <p:nvPr>
+            <p:ph type="dt" sz="half" idx="10"/>
+          </p:nvPr>
+        </p:nvSpPr>
+        <p:spPr/>
+        <p:txBody>
+          <a:bodyPr/>
+          <a:lstStyle/>
+          <a:p>
+            <a:fld id="{1F56560B-483E-4A05-8895-70AE3E92A743}" type="datetimeFigureOut">
+              <a:rPr lang="it-IT">
+                <a:solidFill>
+                  <a:prstClr val="black">
+                    <a:tint val="75000"/>
+                  </a:prstClr>
+                </a:solidFill>
+              </a:rPr>
+              <a:pPr/>
+              <a:t>01/12/2015</a:t>
+            </a:fld>
+            <a:endParaRPr lang="it-IT">
+              <a:solidFill>
+                <a:prstClr val="black">
+                  <a:tint val="75000"/>
+                </a:prstClr>
+              </a:solidFill>
+            </a:endParaRPr>
+          </a:p>
+        </p:txBody>
+      </p:sp>
+      <p:sp>
+        <p:nvSpPr>
+          <p:cNvPr id="5" name="Footer Placeholder 4"/>
+          <p:cNvSpPr>
+            <a:spLocks noGrp="1"/>
+          </p:cNvSpPr>
+          <p:nvPr>
+            <p:ph type="ftr" sz="quarter" idx="11"/>
+          </p:nvPr>
+        </p:nvSpPr>
+        <p:spPr/>
+        <p:txBody>
+          <a:bodyPr/>
+          <a:lstStyle/>
+          <a:p>
+            <a:endParaRPr lang="it-IT">
+              <a:solidFill>
+                <a:prstClr val="black">
+                  <a:tint val="75000"/>
+                </a:prstClr>
+              </a:solidFill>
+            </a:endParaRPr>
+          </a:p>
+        </p:txBody>
+      </p:sp>
+      <p:sp>
+        <p:nvSpPr>
+          <p:cNvPr id="6" name="Slide Number Placeholder 5"/>
+          <p:cNvSpPr>
+            <a:spLocks noGrp="1"/>
+          </p:cNvSpPr>
+          <p:nvPr>
+            <p:ph type="sldNum" sz="quarter" idx="12"/>
+          </p:nvPr>
+        </p:nvSpPr>
+        <p:spPr/>
+        <p:txBody>
+          <a:bodyPr/>
+          <a:lstStyle/>
+          <a:p>
+            <a:fld id="{8C2BE814-DE07-4B1D-A7DA-665B27D573F8}" type="slidenum">
+              <a:rPr lang="it-IT">
+                <a:solidFill>
+                  <a:prstClr val="black">
+                    <a:tint val="75000"/>
+                  </a:prstClr>
+                </a:solidFill>
+              </a:rPr>
+              <a:pPr/>
+              <a:t>‹#›</a:t>
+            </a:fld>
+            <a:endParaRPr lang="it-IT">
+              <a:solidFill>
+                <a:prstClr val="black">
+                  <a:tint val="75000"/>
+                </a:prstClr>
+              </a:solidFill>
+            </a:endParaRPr>
+          </a:p>
+        </p:txBody>
+      </p:sp>
+    </p:spTree>
+    <p:extLst>
+      <p:ext uri="{BB962C8B-B14F-4D97-AF65-F5344CB8AC3E}">
+        <p14:creationId xmlns:p14="http://schemas.microsoft.com/office/powerpoint/2010/main" val="600492292"/>
       </p:ext>
     </p:extLst>
   </p:cSld>
@@ -1009,7 +3663,7 @@
           <a:p>
             <a:fld id="{BE9E4639-3C3E-4B8B-BDFD-ECAC4CBC4975}" type="datetimeFigureOut">
               <a:rPr lang="it-IT" smtClean="0"/>
-              <a:t>29/11/2015</a:t>
+              <a:t>01/12/2015</a:t>
             </a:fld>
             <a:endParaRPr lang="it-IT"/>
           </a:p>
@@ -1241,7 +3895,7 @@
           <a:p>
             <a:fld id="{BE9E4639-3C3E-4B8B-BDFD-ECAC4CBC4975}" type="datetimeFigureOut">
               <a:rPr lang="it-IT" smtClean="0"/>
-              <a:t>29/11/2015</a:t>
+              <a:t>01/12/2015</a:t>
             </a:fld>
             <a:endParaRPr lang="it-IT"/>
           </a:p>
@@ -1608,7 +4262,7 @@
           <a:p>
             <a:fld id="{BE9E4639-3C3E-4B8B-BDFD-ECAC4CBC4975}" type="datetimeFigureOut">
               <a:rPr lang="it-IT" smtClean="0"/>
-              <a:t>29/11/2015</a:t>
+              <a:t>01/12/2015</a:t>
             </a:fld>
             <a:endParaRPr lang="it-IT"/>
           </a:p>
@@ -1726,7 +4380,7 @@
           <a:p>
             <a:fld id="{BE9E4639-3C3E-4B8B-BDFD-ECAC4CBC4975}" type="datetimeFigureOut">
               <a:rPr lang="it-IT" smtClean="0"/>
-              <a:t>29/11/2015</a:t>
+              <a:t>01/12/2015</a:t>
             </a:fld>
             <a:endParaRPr lang="it-IT"/>
           </a:p>
@@ -1821,7 +4475,7 @@
           <a:p>
             <a:fld id="{BE9E4639-3C3E-4B8B-BDFD-ECAC4CBC4975}" type="datetimeFigureOut">
               <a:rPr lang="it-IT" smtClean="0"/>
-              <a:t>29/11/2015</a:t>
+              <a:t>01/12/2015</a:t>
             </a:fld>
             <a:endParaRPr lang="it-IT"/>
           </a:p>
@@ -2098,7 +4752,7 @@
           <a:p>
             <a:fld id="{BE9E4639-3C3E-4B8B-BDFD-ECAC4CBC4975}" type="datetimeFigureOut">
               <a:rPr lang="it-IT" smtClean="0"/>
-              <a:t>29/11/2015</a:t>
+              <a:t>01/12/2015</a:t>
             </a:fld>
             <a:endParaRPr lang="it-IT"/>
           </a:p>
@@ -2351,7 +5005,7 @@
           <a:p>
             <a:fld id="{BE9E4639-3C3E-4B8B-BDFD-ECAC4CBC4975}" type="datetimeFigureOut">
               <a:rPr lang="it-IT" smtClean="0"/>
-              <a:t>29/11/2015</a:t>
+              <a:t>01/12/2015</a:t>
             </a:fld>
             <a:endParaRPr lang="it-IT"/>
           </a:p>
@@ -2564,7 +5218,7 @@
           <a:p>
             <a:fld id="{BE9E4639-3C3E-4B8B-BDFD-ECAC4CBC4975}" type="datetimeFigureOut">
               <a:rPr lang="it-IT" smtClean="0"/>
-              <a:t>29/11/2015</a:t>
+              <a:t>01/12/2015</a:t>
             </a:fld>
             <a:endParaRPr lang="it-IT"/>
           </a:p>
@@ -2668,6 +5322,578 @@
     <p:sldLayoutId id="2147483657" r:id="rId9"/>
     <p:sldLayoutId id="2147483658" r:id="rId10"/>
     <p:sldLayoutId id="2147483659" r:id="rId11"/>
+  </p:sldLayoutIdLst>
+  <p:txStyles>
+    <p:titleStyle>
+      <a:lvl1pPr algn="l" defTabSz="914400" rtl="0" eaLnBrk="1" latinLnBrk="0" hangingPunct="1">
+        <a:lnSpc>
+          <a:spcPct val="90000"/>
+        </a:lnSpc>
+        <a:spcBef>
+          <a:spcPct val="0"/>
+        </a:spcBef>
+        <a:buNone/>
+        <a:defRPr sz="4400" kern="1200">
+          <a:solidFill>
+            <a:schemeClr val="tx1"/>
+          </a:solidFill>
+          <a:latin typeface="+mj-lt"/>
+          <a:ea typeface="+mj-ea"/>
+          <a:cs typeface="+mj-cs"/>
+        </a:defRPr>
+      </a:lvl1pPr>
+    </p:titleStyle>
+    <p:bodyStyle>
+      <a:lvl1pPr marL="228600" indent="-228600" algn="l" defTabSz="914400" rtl="0" eaLnBrk="1" latinLnBrk="0" hangingPunct="1">
+        <a:lnSpc>
+          <a:spcPct val="90000"/>
+        </a:lnSpc>
+        <a:spcBef>
+          <a:spcPts val="1000"/>
+        </a:spcBef>
+        <a:buFont typeface="Arial" panose="020B0604020202020204" pitchFamily="34" charset="0"/>
+        <a:buChar char="•"/>
+        <a:defRPr sz="2800" kern="1200">
+          <a:solidFill>
+            <a:schemeClr val="tx1"/>
+          </a:solidFill>
+          <a:latin typeface="+mn-lt"/>
+          <a:ea typeface="+mn-ea"/>
+          <a:cs typeface="+mn-cs"/>
+        </a:defRPr>
+      </a:lvl1pPr>
+      <a:lvl2pPr marL="685800" indent="-228600" algn="l" defTabSz="914400" rtl="0" eaLnBrk="1" latinLnBrk="0" hangingPunct="1">
+        <a:lnSpc>
+          <a:spcPct val="90000"/>
+        </a:lnSpc>
+        <a:spcBef>
+          <a:spcPts val="500"/>
+        </a:spcBef>
+        <a:buFont typeface="Arial" panose="020B0604020202020204" pitchFamily="34" charset="0"/>
+        <a:buChar char="•"/>
+        <a:defRPr sz="2400" kern="1200">
+          <a:solidFill>
+            <a:schemeClr val="tx1"/>
+          </a:solidFill>
+          <a:latin typeface="+mn-lt"/>
+          <a:ea typeface="+mn-ea"/>
+          <a:cs typeface="+mn-cs"/>
+        </a:defRPr>
+      </a:lvl2pPr>
+      <a:lvl3pPr marL="1143000" indent="-228600" algn="l" defTabSz="914400" rtl="0" eaLnBrk="1" latinLnBrk="0" hangingPunct="1">
+        <a:lnSpc>
+          <a:spcPct val="90000"/>
+        </a:lnSpc>
+        <a:spcBef>
+          <a:spcPts val="500"/>
+        </a:spcBef>
+        <a:buFont typeface="Arial" panose="020B0604020202020204" pitchFamily="34" charset="0"/>
+        <a:buChar char="•"/>
+        <a:defRPr sz="2000" kern="1200">
+          <a:solidFill>
+            <a:schemeClr val="tx1"/>
+          </a:solidFill>
+          <a:latin typeface="+mn-lt"/>
+          <a:ea typeface="+mn-ea"/>
+          <a:cs typeface="+mn-cs"/>
+        </a:defRPr>
+      </a:lvl3pPr>
+      <a:lvl4pPr marL="1600200" indent="-228600" algn="l" defTabSz="914400" rtl="0" eaLnBrk="1" latinLnBrk="0" hangingPunct="1">
+        <a:lnSpc>
+          <a:spcPct val="90000"/>
+        </a:lnSpc>
+        <a:spcBef>
+          <a:spcPts val="500"/>
+        </a:spcBef>
+        <a:buFont typeface="Arial" panose="020B0604020202020204" pitchFamily="34" charset="0"/>
+        <a:buChar char="•"/>
+        <a:defRPr sz="1800" kern="1200">
+          <a:solidFill>
+            <a:schemeClr val="tx1"/>
+          </a:solidFill>
+          <a:latin typeface="+mn-lt"/>
+          <a:ea typeface="+mn-ea"/>
+          <a:cs typeface="+mn-cs"/>
+        </a:defRPr>
+      </a:lvl4pPr>
+      <a:lvl5pPr marL="2057400" indent="-228600" algn="l" defTabSz="914400" rtl="0" eaLnBrk="1" latinLnBrk="0" hangingPunct="1">
+        <a:lnSpc>
+          <a:spcPct val="90000"/>
+        </a:lnSpc>
+        <a:spcBef>
+          <a:spcPts val="500"/>
+        </a:spcBef>
+        <a:buFont typeface="Arial" panose="020B0604020202020204" pitchFamily="34" charset="0"/>
+        <a:buChar char="•"/>
+        <a:defRPr sz="1800" kern="1200">
+          <a:solidFill>
+            <a:schemeClr val="tx1"/>
+          </a:solidFill>
+          <a:latin typeface="+mn-lt"/>
+          <a:ea typeface="+mn-ea"/>
+          <a:cs typeface="+mn-cs"/>
+        </a:defRPr>
+      </a:lvl5pPr>
+      <a:lvl6pPr marL="2514600" indent="-228600" algn="l" defTabSz="914400" rtl="0" eaLnBrk="1" latinLnBrk="0" hangingPunct="1">
+        <a:lnSpc>
+          <a:spcPct val="90000"/>
+        </a:lnSpc>
+        <a:spcBef>
+          <a:spcPts val="500"/>
+        </a:spcBef>
+        <a:buFont typeface="Arial" panose="020B0604020202020204" pitchFamily="34" charset="0"/>
+        <a:buChar char="•"/>
+        <a:defRPr sz="1800" kern="1200">
+          <a:solidFill>
+            <a:schemeClr val="tx1"/>
+          </a:solidFill>
+          <a:latin typeface="+mn-lt"/>
+          <a:ea typeface="+mn-ea"/>
+          <a:cs typeface="+mn-cs"/>
+        </a:defRPr>
+      </a:lvl6pPr>
+      <a:lvl7pPr marL="2971800" indent="-228600" algn="l" defTabSz="914400" rtl="0" eaLnBrk="1" latinLnBrk="0" hangingPunct="1">
+        <a:lnSpc>
+          <a:spcPct val="90000"/>
+        </a:lnSpc>
+        <a:spcBef>
+          <a:spcPts val="500"/>
+        </a:spcBef>
+        <a:buFont typeface="Arial" panose="020B0604020202020204" pitchFamily="34" charset="0"/>
+        <a:buChar char="•"/>
+        <a:defRPr sz="1800" kern="1200">
+          <a:solidFill>
+            <a:schemeClr val="tx1"/>
+          </a:solidFill>
+          <a:latin typeface="+mn-lt"/>
+          <a:ea typeface="+mn-ea"/>
+          <a:cs typeface="+mn-cs"/>
+        </a:defRPr>
+      </a:lvl7pPr>
+      <a:lvl8pPr marL="3429000" indent="-228600" algn="l" defTabSz="914400" rtl="0" eaLnBrk="1" latinLnBrk="0" hangingPunct="1">
+        <a:lnSpc>
+          <a:spcPct val="90000"/>
+        </a:lnSpc>
+        <a:spcBef>
+          <a:spcPts val="500"/>
+        </a:spcBef>
+        <a:buFont typeface="Arial" panose="020B0604020202020204" pitchFamily="34" charset="0"/>
+        <a:buChar char="•"/>
+        <a:defRPr sz="1800" kern="1200">
+          <a:solidFill>
+            <a:schemeClr val="tx1"/>
+          </a:solidFill>
+          <a:latin typeface="+mn-lt"/>
+          <a:ea typeface="+mn-ea"/>
+          <a:cs typeface="+mn-cs"/>
+        </a:defRPr>
+      </a:lvl8pPr>
+      <a:lvl9pPr marL="3886200" indent="-228600" algn="l" defTabSz="914400" rtl="0" eaLnBrk="1" latinLnBrk="0" hangingPunct="1">
+        <a:lnSpc>
+          <a:spcPct val="90000"/>
+        </a:lnSpc>
+        <a:spcBef>
+          <a:spcPts val="500"/>
+        </a:spcBef>
+        <a:buFont typeface="Arial" panose="020B0604020202020204" pitchFamily="34" charset="0"/>
+        <a:buChar char="•"/>
+        <a:defRPr sz="1800" kern="1200">
+          <a:solidFill>
+            <a:schemeClr val="tx1"/>
+          </a:solidFill>
+          <a:latin typeface="+mn-lt"/>
+          <a:ea typeface="+mn-ea"/>
+          <a:cs typeface="+mn-cs"/>
+        </a:defRPr>
+      </a:lvl9pPr>
+    </p:bodyStyle>
+    <p:otherStyle>
+      <a:defPPr>
+        <a:defRPr lang="it-IT"/>
+      </a:defPPr>
+      <a:lvl1pPr marL="0" algn="l" defTabSz="914400" rtl="0" eaLnBrk="1" latinLnBrk="0" hangingPunct="1">
+        <a:defRPr sz="1800" kern="1200">
+          <a:solidFill>
+            <a:schemeClr val="tx1"/>
+          </a:solidFill>
+          <a:latin typeface="+mn-lt"/>
+          <a:ea typeface="+mn-ea"/>
+          <a:cs typeface="+mn-cs"/>
+        </a:defRPr>
+      </a:lvl1pPr>
+      <a:lvl2pPr marL="457200" algn="l" defTabSz="914400" rtl="0" eaLnBrk="1" latinLnBrk="0" hangingPunct="1">
+        <a:defRPr sz="1800" kern="1200">
+          <a:solidFill>
+            <a:schemeClr val="tx1"/>
+          </a:solidFill>
+          <a:latin typeface="+mn-lt"/>
+          <a:ea typeface="+mn-ea"/>
+          <a:cs typeface="+mn-cs"/>
+        </a:defRPr>
+      </a:lvl2pPr>
+      <a:lvl3pPr marL="914400" algn="l" defTabSz="914400" rtl="0" eaLnBrk="1" latinLnBrk="0" hangingPunct="1">
+        <a:defRPr sz="1800" kern="1200">
+          <a:solidFill>
+            <a:schemeClr val="tx1"/>
+          </a:solidFill>
+          <a:latin typeface="+mn-lt"/>
+          <a:ea typeface="+mn-ea"/>
+          <a:cs typeface="+mn-cs"/>
+        </a:defRPr>
+      </a:lvl3pPr>
+      <a:lvl4pPr marL="1371600" algn="l" defTabSz="914400" rtl="0" eaLnBrk="1" latinLnBrk="0" hangingPunct="1">
+        <a:defRPr sz="1800" kern="1200">
+          <a:solidFill>
+            <a:schemeClr val="tx1"/>
+          </a:solidFill>
+          <a:latin typeface="+mn-lt"/>
+          <a:ea typeface="+mn-ea"/>
+          <a:cs typeface="+mn-cs"/>
+        </a:defRPr>
+      </a:lvl4pPr>
+      <a:lvl5pPr marL="1828800" algn="l" defTabSz="914400" rtl="0" eaLnBrk="1" latinLnBrk="0" hangingPunct="1">
+        <a:defRPr sz="1800" kern="1200">
+          <a:solidFill>
+            <a:schemeClr val="tx1"/>
+          </a:solidFill>
+          <a:latin typeface="+mn-lt"/>
+          <a:ea typeface="+mn-ea"/>
+          <a:cs typeface="+mn-cs"/>
+        </a:defRPr>
+      </a:lvl5pPr>
+      <a:lvl6pPr marL="2286000" algn="l" defTabSz="914400" rtl="0" eaLnBrk="1" latinLnBrk="0" hangingPunct="1">
+        <a:defRPr sz="1800" kern="1200">
+          <a:solidFill>
+            <a:schemeClr val="tx1"/>
+          </a:solidFill>
+          <a:latin typeface="+mn-lt"/>
+          <a:ea typeface="+mn-ea"/>
+          <a:cs typeface="+mn-cs"/>
+        </a:defRPr>
+      </a:lvl6pPr>
+      <a:lvl7pPr marL="2743200" algn="l" defTabSz="914400" rtl="0" eaLnBrk="1" latinLnBrk="0" hangingPunct="1">
+        <a:defRPr sz="1800" kern="1200">
+          <a:solidFill>
+            <a:schemeClr val="tx1"/>
+          </a:solidFill>
+          <a:latin typeface="+mn-lt"/>
+          <a:ea typeface="+mn-ea"/>
+          <a:cs typeface="+mn-cs"/>
+        </a:defRPr>
+      </a:lvl7pPr>
+      <a:lvl8pPr marL="3200400" algn="l" defTabSz="914400" rtl="0" eaLnBrk="1" latinLnBrk="0" hangingPunct="1">
+        <a:defRPr sz="1800" kern="1200">
+          <a:solidFill>
+            <a:schemeClr val="tx1"/>
+          </a:solidFill>
+          <a:latin typeface="+mn-lt"/>
+          <a:ea typeface="+mn-ea"/>
+          <a:cs typeface="+mn-cs"/>
+        </a:defRPr>
+      </a:lvl8pPr>
+      <a:lvl9pPr marL="3657600" algn="l" defTabSz="914400" rtl="0" eaLnBrk="1" latinLnBrk="0" hangingPunct="1">
+        <a:defRPr sz="1800" kern="1200">
+          <a:solidFill>
+            <a:schemeClr val="tx1"/>
+          </a:solidFill>
+          <a:latin typeface="+mn-lt"/>
+          <a:ea typeface="+mn-ea"/>
+          <a:cs typeface="+mn-cs"/>
+        </a:defRPr>
+      </a:lvl9pPr>
+    </p:otherStyle>
+  </p:txStyles>
+</p:sldMaster>
+</file>
+
+<file path=ppt/slideMasters/slideMaster2.xml><?xml version="1.0" encoding="utf-8"?>
+<p:sldMaster xmlns:a="http://schemas.openxmlformats.org/drawingml/2006/main" xmlns:r="http://schemas.openxmlformats.org/officeDocument/2006/relationships" xmlns:p="http://schemas.openxmlformats.org/presentationml/2006/main">
+  <p:cSld>
+    <p:bg>
+      <p:bgRef idx="1001">
+        <a:schemeClr val="bg1"/>
+      </p:bgRef>
+    </p:bg>
+    <p:spTree>
+      <p:nvGrpSpPr>
+        <p:cNvPr id="1" name=""/>
+        <p:cNvGrpSpPr/>
+        <p:nvPr/>
+      </p:nvGrpSpPr>
+      <p:grpSpPr>
+        <a:xfrm>
+          <a:off x="0" y="0"/>
+          <a:ext cx="0" cy="0"/>
+          <a:chOff x="0" y="0"/>
+          <a:chExt cx="0" cy="0"/>
+        </a:xfrm>
+      </p:grpSpPr>
+      <p:sp>
+        <p:nvSpPr>
+          <p:cNvPr id="2" name="Title Placeholder 1"/>
+          <p:cNvSpPr>
+            <a:spLocks noGrp="1"/>
+          </p:cNvSpPr>
+          <p:nvPr>
+            <p:ph type="title"/>
+          </p:nvPr>
+        </p:nvSpPr>
+        <p:spPr>
+          <a:xfrm>
+            <a:off x="838200" y="365125"/>
+            <a:ext cx="10515600" cy="1325563"/>
+          </a:xfrm>
+          <a:prstGeom prst="rect">
+            <a:avLst/>
+          </a:prstGeom>
+        </p:spPr>
+        <p:txBody>
+          <a:bodyPr vert="horz" lIns="91440" tIns="45720" rIns="91440" bIns="45720" rtlCol="0" anchor="ctr">
+            <a:normAutofit/>
+          </a:bodyPr>
+          <a:lstStyle/>
+          <a:p>
+            <a:r>
+              <a:rPr lang="en-US" smtClean="0"/>
+              <a:t>Click to edit Master title style</a:t>
+            </a:r>
+            <a:endParaRPr lang="it-IT"/>
+          </a:p>
+        </p:txBody>
+      </p:sp>
+      <p:sp>
+        <p:nvSpPr>
+          <p:cNvPr id="3" name="Text Placeholder 2"/>
+          <p:cNvSpPr>
+            <a:spLocks noGrp="1"/>
+          </p:cNvSpPr>
+          <p:nvPr>
+            <p:ph type="body" idx="1"/>
+          </p:nvPr>
+        </p:nvSpPr>
+        <p:spPr>
+          <a:xfrm>
+            <a:off x="838200" y="1825625"/>
+            <a:ext cx="10515600" cy="4351338"/>
+          </a:xfrm>
+          <a:prstGeom prst="rect">
+            <a:avLst/>
+          </a:prstGeom>
+        </p:spPr>
+        <p:txBody>
+          <a:bodyPr vert="horz" lIns="91440" tIns="45720" rIns="91440" bIns="45720" rtlCol="0">
+            <a:normAutofit/>
+          </a:bodyPr>
+          <a:lstStyle/>
+          <a:p>
+            <a:pPr lvl="0"/>
+            <a:r>
+              <a:rPr lang="en-US" smtClean="0"/>
+              <a:t>Click to edit Master text styles</a:t>
+            </a:r>
+          </a:p>
+          <a:p>
+            <a:pPr lvl="1"/>
+            <a:r>
+              <a:rPr lang="en-US" smtClean="0"/>
+              <a:t>Second level</a:t>
+            </a:r>
+          </a:p>
+          <a:p>
+            <a:pPr lvl="2"/>
+            <a:r>
+              <a:rPr lang="en-US" smtClean="0"/>
+              <a:t>Third level</a:t>
+            </a:r>
+          </a:p>
+          <a:p>
+            <a:pPr lvl="3"/>
+            <a:r>
+              <a:rPr lang="en-US" smtClean="0"/>
+              <a:t>Fourth level</a:t>
+            </a:r>
+          </a:p>
+          <a:p>
+            <a:pPr lvl="4"/>
+            <a:r>
+              <a:rPr lang="en-US" smtClean="0"/>
+              <a:t>Fifth level</a:t>
+            </a:r>
+            <a:endParaRPr lang="it-IT"/>
+          </a:p>
+        </p:txBody>
+      </p:sp>
+      <p:sp>
+        <p:nvSpPr>
+          <p:cNvPr id="4" name="Date Placeholder 3"/>
+          <p:cNvSpPr>
+            <a:spLocks noGrp="1"/>
+          </p:cNvSpPr>
+          <p:nvPr>
+            <p:ph type="dt" sz="half" idx="2"/>
+          </p:nvPr>
+        </p:nvSpPr>
+        <p:spPr>
+          <a:xfrm>
+            <a:off x="838200" y="6356350"/>
+            <a:ext cx="2743200" cy="365125"/>
+          </a:xfrm>
+          <a:prstGeom prst="rect">
+            <a:avLst/>
+          </a:prstGeom>
+        </p:spPr>
+        <p:txBody>
+          <a:bodyPr vert="horz" lIns="91440" tIns="45720" rIns="91440" bIns="45720" rtlCol="0" anchor="ctr"/>
+          <a:lstStyle>
+            <a:lvl1pPr algn="l">
+              <a:defRPr sz="1200">
+                <a:solidFill>
+                  <a:schemeClr val="tx1">
+                    <a:tint val="75000"/>
+                  </a:schemeClr>
+                </a:solidFill>
+              </a:defRPr>
+            </a:lvl1pPr>
+          </a:lstStyle>
+          <a:p>
+            <a:fld id="{1F56560B-483E-4A05-8895-70AE3E92A743}" type="datetimeFigureOut">
+              <a:rPr lang="it-IT" smtClean="0">
+                <a:solidFill>
+                  <a:prstClr val="black">
+                    <a:tint val="75000"/>
+                  </a:prstClr>
+                </a:solidFill>
+              </a:rPr>
+              <a:pPr/>
+              <a:t>01/12/2015</a:t>
+            </a:fld>
+            <a:endParaRPr lang="it-IT" smtClean="0">
+              <a:solidFill>
+                <a:prstClr val="black">
+                  <a:tint val="75000"/>
+                </a:prstClr>
+              </a:solidFill>
+            </a:endParaRPr>
+          </a:p>
+        </p:txBody>
+      </p:sp>
+      <p:sp>
+        <p:nvSpPr>
+          <p:cNvPr id="5" name="Footer Placeholder 4"/>
+          <p:cNvSpPr>
+            <a:spLocks noGrp="1"/>
+          </p:cNvSpPr>
+          <p:nvPr>
+            <p:ph type="ftr" sz="quarter" idx="3"/>
+          </p:nvPr>
+        </p:nvSpPr>
+        <p:spPr>
+          <a:xfrm>
+            <a:off x="4038600" y="6356350"/>
+            <a:ext cx="4114800" cy="365125"/>
+          </a:xfrm>
+          <a:prstGeom prst="rect">
+            <a:avLst/>
+          </a:prstGeom>
+        </p:spPr>
+        <p:txBody>
+          <a:bodyPr vert="horz" lIns="91440" tIns="45720" rIns="91440" bIns="45720" rtlCol="0" anchor="ctr"/>
+          <a:lstStyle>
+            <a:lvl1pPr algn="ctr">
+              <a:defRPr sz="1200">
+                <a:solidFill>
+                  <a:schemeClr val="tx1">
+                    <a:tint val="75000"/>
+                  </a:schemeClr>
+                </a:solidFill>
+              </a:defRPr>
+            </a:lvl1pPr>
+          </a:lstStyle>
+          <a:p>
+            <a:endParaRPr lang="it-IT" smtClean="0">
+              <a:solidFill>
+                <a:prstClr val="black">
+                  <a:tint val="75000"/>
+                </a:prstClr>
+              </a:solidFill>
+            </a:endParaRPr>
+          </a:p>
+        </p:txBody>
+      </p:sp>
+      <p:sp>
+        <p:nvSpPr>
+          <p:cNvPr id="6" name="Slide Number Placeholder 5"/>
+          <p:cNvSpPr>
+            <a:spLocks noGrp="1"/>
+          </p:cNvSpPr>
+          <p:nvPr>
+            <p:ph type="sldNum" sz="quarter" idx="4"/>
+          </p:nvPr>
+        </p:nvSpPr>
+        <p:spPr>
+          <a:xfrm>
+            <a:off x="8610600" y="6356350"/>
+            <a:ext cx="2743200" cy="365125"/>
+          </a:xfrm>
+          <a:prstGeom prst="rect">
+            <a:avLst/>
+          </a:prstGeom>
+        </p:spPr>
+        <p:txBody>
+          <a:bodyPr vert="horz" lIns="91440" tIns="45720" rIns="91440" bIns="45720" rtlCol="0" anchor="ctr"/>
+          <a:lstStyle>
+            <a:lvl1pPr algn="r">
+              <a:defRPr sz="1200">
+                <a:solidFill>
+                  <a:schemeClr val="tx1">
+                    <a:tint val="75000"/>
+                  </a:schemeClr>
+                </a:solidFill>
+              </a:defRPr>
+            </a:lvl1pPr>
+          </a:lstStyle>
+          <a:p>
+            <a:fld id="{8C2BE814-DE07-4B1D-A7DA-665B27D573F8}" type="slidenum">
+              <a:rPr lang="it-IT" smtClean="0">
+                <a:solidFill>
+                  <a:prstClr val="black">
+                    <a:tint val="75000"/>
+                  </a:prstClr>
+                </a:solidFill>
+              </a:rPr>
+              <a:pPr/>
+              <a:t>‹#›</a:t>
+            </a:fld>
+            <a:endParaRPr lang="it-IT" smtClean="0">
+              <a:solidFill>
+                <a:prstClr val="black">
+                  <a:tint val="75000"/>
+                </a:prstClr>
+              </a:solidFill>
+            </a:endParaRPr>
+          </a:p>
+        </p:txBody>
+      </p:sp>
+    </p:spTree>
+    <p:extLst>
+      <p:ext uri="{BB962C8B-B14F-4D97-AF65-F5344CB8AC3E}">
+        <p14:creationId xmlns:p14="http://schemas.microsoft.com/office/powerpoint/2010/main" val="435572811"/>
+      </p:ext>
+    </p:extLst>
+  </p:cSld>
+  <p:clrMap bg1="lt1" tx1="dk1" bg2="lt2" tx2="dk2" accent1="accent1" accent2="accent2" accent3="accent3" accent4="accent4" accent5="accent5" accent6="accent6" hlink="hlink" folHlink="folHlink"/>
+  <p:sldLayoutIdLst>
+    <p:sldLayoutId id="2147483661" r:id="rId1"/>
+    <p:sldLayoutId id="2147483662" r:id="rId2"/>
+    <p:sldLayoutId id="2147483663" r:id="rId3"/>
+    <p:sldLayoutId id="2147483664" r:id="rId4"/>
+    <p:sldLayoutId id="2147483665" r:id="rId5"/>
+    <p:sldLayoutId id="2147483666" r:id="rId6"/>
+    <p:sldLayoutId id="2147483667" r:id="rId7"/>
+    <p:sldLayoutId id="2147483668" r:id="rId8"/>
+    <p:sldLayoutId id="2147483669" r:id="rId9"/>
+    <p:sldLayoutId id="2147483670" r:id="rId10"/>
+    <p:sldLayoutId id="2147483671" r:id="rId11"/>
   </p:sldLayoutIdLst>
   <p:txStyles>
     <p:titleStyle>
@@ -3070,7 +6296,6 @@
                 <a:rPr lang="it-IT" sz="1200" dirty="0" smtClean="0"/>
                 <a:t>id</a:t>
               </a:r>
-              <a:endParaRPr lang="it-IT" sz="1200" dirty="0" smtClean="0"/>
             </a:p>
             <a:p>
               <a:pPr marL="285750" indent="-285750">
@@ -3233,7 +6458,6 @@
                 <a:rPr lang="it-IT" sz="1200" dirty="0" smtClean="0"/>
                 <a:t>id</a:t>
               </a:r>
-              <a:endParaRPr lang="it-IT" sz="1200" dirty="0" smtClean="0"/>
             </a:p>
             <a:p>
               <a:pPr marL="285750" indent="-285750">
@@ -3594,6 +6818,955 @@
   <p:clrMapOvr>
     <a:masterClrMapping/>
   </p:clrMapOvr>
+  <p:timing>
+    <p:tnLst>
+      <p:par>
+        <p:cTn id="1" dur="indefinite" restart="never" nodeType="tmRoot"/>
+      </p:par>
+    </p:tnLst>
+  </p:timing>
+</p:sld>
+</file>
+
+<file path=ppt/slides/slide2.xml><?xml version="1.0" encoding="utf-8"?>
+<p:sld xmlns:a="http://schemas.openxmlformats.org/drawingml/2006/main" xmlns:r="http://schemas.openxmlformats.org/officeDocument/2006/relationships" xmlns:p="http://schemas.openxmlformats.org/presentationml/2006/main">
+  <p:cSld>
+    <p:spTree>
+      <p:nvGrpSpPr>
+        <p:cNvPr id="1" name=""/>
+        <p:cNvGrpSpPr/>
+        <p:nvPr/>
+      </p:nvGrpSpPr>
+      <p:grpSpPr>
+        <a:xfrm>
+          <a:off x="0" y="0"/>
+          <a:ext cx="0" cy="0"/>
+          <a:chOff x="0" y="0"/>
+          <a:chExt cx="0" cy="0"/>
+        </a:xfrm>
+      </p:grpSpPr>
+      <p:pic>
+        <p:nvPicPr>
+          <p:cNvPr id="4" name="Picture 3"/>
+          <p:cNvPicPr>
+            <a:picLocks noChangeAspect="1"/>
+          </p:cNvPicPr>
+          <p:nvPr/>
+        </p:nvPicPr>
+        <p:blipFill>
+          <a:blip r:embed="rId2">
+            <a:duotone>
+              <a:schemeClr val="accent1">
+                <a:shade val="45000"/>
+                <a:satMod val="135000"/>
+              </a:schemeClr>
+              <a:prstClr val="white"/>
+            </a:duotone>
+          </a:blip>
+          <a:stretch>
+            <a:fillRect/>
+          </a:stretch>
+        </p:blipFill>
+        <p:spPr>
+          <a:xfrm>
+            <a:off x="0" y="1"/>
+            <a:ext cx="5208836" cy="6858000"/>
+          </a:xfrm>
+          <a:prstGeom prst="rect">
+            <a:avLst/>
+          </a:prstGeom>
+          <a:effectLst>
+            <a:innerShdw blurRad="63500" dist="50800">
+              <a:prstClr val="black">
+                <a:alpha val="50000"/>
+              </a:prstClr>
+            </a:innerShdw>
+          </a:effectLst>
+        </p:spPr>
+      </p:pic>
+      <p:sp>
+        <p:nvSpPr>
+          <p:cNvPr id="5" name="Rectangle 4"/>
+          <p:cNvSpPr/>
+          <p:nvPr/>
+        </p:nvSpPr>
+        <p:spPr>
+          <a:xfrm>
+            <a:off x="5548747" y="862445"/>
+            <a:ext cx="6244936" cy="1641764"/>
+          </a:xfrm>
+          <a:prstGeom prst="rect">
+            <a:avLst/>
+          </a:prstGeom>
+          <a:solidFill>
+            <a:schemeClr val="bg1"/>
+          </a:solidFill>
+          <a:ln>
+            <a:solidFill>
+              <a:schemeClr val="bg2"/>
+            </a:solidFill>
+          </a:ln>
+          <a:effectLst>
+            <a:outerShdw blurRad="50800" dist="38100" dir="5400000" algn="t" rotWithShape="0">
+              <a:prstClr val="black">
+                <a:alpha val="40000"/>
+              </a:prstClr>
+            </a:outerShdw>
+          </a:effectLst>
+        </p:spPr>
+        <p:style>
+          <a:lnRef idx="2">
+            <a:schemeClr val="accent1">
+              <a:shade val="50000"/>
+            </a:schemeClr>
+          </a:lnRef>
+          <a:fillRef idx="1">
+            <a:schemeClr val="accent1"/>
+          </a:fillRef>
+          <a:effectRef idx="0">
+            <a:schemeClr val="accent1"/>
+          </a:effectRef>
+          <a:fontRef idx="minor">
+            <a:schemeClr val="lt1"/>
+          </a:fontRef>
+        </p:style>
+        <p:txBody>
+          <a:bodyPr rtlCol="0" anchor="ctr"/>
+          <a:lstStyle/>
+          <a:p>
+            <a:pPr algn="ctr"/>
+            <a:endParaRPr lang="it-IT" smtClean="0">
+              <a:solidFill>
+                <a:prstClr val="white"/>
+              </a:solidFill>
+            </a:endParaRPr>
+          </a:p>
+        </p:txBody>
+      </p:sp>
+      <p:sp>
+        <p:nvSpPr>
+          <p:cNvPr id="6" name="Rectangle 5"/>
+          <p:cNvSpPr/>
+          <p:nvPr/>
+        </p:nvSpPr>
+        <p:spPr>
+          <a:xfrm>
+            <a:off x="5548747" y="2760518"/>
+            <a:ext cx="6244936" cy="1641764"/>
+          </a:xfrm>
+          <a:prstGeom prst="rect">
+            <a:avLst/>
+          </a:prstGeom>
+          <a:solidFill>
+            <a:schemeClr val="bg1"/>
+          </a:solidFill>
+          <a:ln>
+            <a:solidFill>
+              <a:schemeClr val="bg2"/>
+            </a:solidFill>
+          </a:ln>
+          <a:effectLst>
+            <a:outerShdw blurRad="50800" dist="38100" dir="5400000" algn="t" rotWithShape="0">
+              <a:prstClr val="black">
+                <a:alpha val="40000"/>
+              </a:prstClr>
+            </a:outerShdw>
+          </a:effectLst>
+        </p:spPr>
+        <p:style>
+          <a:lnRef idx="2">
+            <a:schemeClr val="accent1">
+              <a:shade val="50000"/>
+            </a:schemeClr>
+          </a:lnRef>
+          <a:fillRef idx="1">
+            <a:schemeClr val="accent1"/>
+          </a:fillRef>
+          <a:effectRef idx="0">
+            <a:schemeClr val="accent1"/>
+          </a:effectRef>
+          <a:fontRef idx="minor">
+            <a:schemeClr val="lt1"/>
+          </a:fontRef>
+        </p:style>
+        <p:txBody>
+          <a:bodyPr rtlCol="0" anchor="ctr"/>
+          <a:lstStyle/>
+          <a:p>
+            <a:pPr algn="ctr"/>
+            <a:endParaRPr lang="it-IT" smtClean="0">
+              <a:solidFill>
+                <a:prstClr val="white"/>
+              </a:solidFill>
+            </a:endParaRPr>
+          </a:p>
+        </p:txBody>
+      </p:sp>
+      <p:sp>
+        <p:nvSpPr>
+          <p:cNvPr id="7" name="Rectangle 6"/>
+          <p:cNvSpPr/>
+          <p:nvPr/>
+        </p:nvSpPr>
+        <p:spPr>
+          <a:xfrm>
+            <a:off x="5548747" y="4658591"/>
+            <a:ext cx="6244936" cy="1641764"/>
+          </a:xfrm>
+          <a:prstGeom prst="rect">
+            <a:avLst/>
+          </a:prstGeom>
+          <a:solidFill>
+            <a:schemeClr val="bg1"/>
+          </a:solidFill>
+          <a:ln>
+            <a:solidFill>
+              <a:schemeClr val="bg2"/>
+            </a:solidFill>
+          </a:ln>
+          <a:effectLst>
+            <a:outerShdw blurRad="50800" dist="38100" dir="5400000" algn="t" rotWithShape="0">
+              <a:prstClr val="black">
+                <a:alpha val="40000"/>
+              </a:prstClr>
+            </a:outerShdw>
+          </a:effectLst>
+        </p:spPr>
+        <p:style>
+          <a:lnRef idx="2">
+            <a:schemeClr val="accent1">
+              <a:shade val="50000"/>
+            </a:schemeClr>
+          </a:lnRef>
+          <a:fillRef idx="1">
+            <a:schemeClr val="accent1"/>
+          </a:fillRef>
+          <a:effectRef idx="0">
+            <a:schemeClr val="accent1"/>
+          </a:effectRef>
+          <a:fontRef idx="minor">
+            <a:schemeClr val="lt1"/>
+          </a:fontRef>
+        </p:style>
+        <p:txBody>
+          <a:bodyPr rtlCol="0" anchor="ctr"/>
+          <a:lstStyle/>
+          <a:p>
+            <a:pPr algn="ctr"/>
+            <a:endParaRPr lang="it-IT" smtClean="0">
+              <a:solidFill>
+                <a:prstClr val="white"/>
+              </a:solidFill>
+            </a:endParaRPr>
+          </a:p>
+        </p:txBody>
+      </p:sp>
+      <p:sp>
+        <p:nvSpPr>
+          <p:cNvPr id="8" name="Rectangle 7"/>
+          <p:cNvSpPr/>
+          <p:nvPr/>
+        </p:nvSpPr>
+        <p:spPr>
+          <a:xfrm>
+            <a:off x="12053455" y="0"/>
+            <a:ext cx="138545" cy="6858000"/>
+          </a:xfrm>
+          <a:prstGeom prst="rect">
+            <a:avLst/>
+          </a:prstGeom>
+          <a:solidFill>
+            <a:schemeClr val="bg1">
+              <a:lumMod val="95000"/>
+            </a:schemeClr>
+          </a:solidFill>
+          <a:ln>
+            <a:noFill/>
+          </a:ln>
+        </p:spPr>
+        <p:style>
+          <a:lnRef idx="2">
+            <a:schemeClr val="accent1">
+              <a:shade val="50000"/>
+            </a:schemeClr>
+          </a:lnRef>
+          <a:fillRef idx="1">
+            <a:schemeClr val="accent1"/>
+          </a:fillRef>
+          <a:effectRef idx="0">
+            <a:schemeClr val="accent1"/>
+          </a:effectRef>
+          <a:fontRef idx="minor">
+            <a:schemeClr val="lt1"/>
+          </a:fontRef>
+        </p:style>
+        <p:txBody>
+          <a:bodyPr rtlCol="0" anchor="ctr"/>
+          <a:lstStyle/>
+          <a:p>
+            <a:pPr algn="ctr"/>
+            <a:endParaRPr lang="it-IT" smtClean="0">
+              <a:solidFill>
+                <a:prstClr val="white"/>
+              </a:solidFill>
+            </a:endParaRPr>
+          </a:p>
+        </p:txBody>
+      </p:sp>
+      <p:sp>
+        <p:nvSpPr>
+          <p:cNvPr id="9" name="Rectangle 8"/>
+          <p:cNvSpPr/>
+          <p:nvPr/>
+        </p:nvSpPr>
+        <p:spPr>
+          <a:xfrm>
+            <a:off x="12053455" y="150861"/>
+            <a:ext cx="138545" cy="2185169"/>
+          </a:xfrm>
+          <a:prstGeom prst="rect">
+            <a:avLst/>
+          </a:prstGeom>
+          <a:solidFill>
+            <a:schemeClr val="bg1">
+              <a:lumMod val="65000"/>
+            </a:schemeClr>
+          </a:solidFill>
+          <a:ln>
+            <a:solidFill>
+              <a:schemeClr val="bg2"/>
+            </a:solidFill>
+          </a:ln>
+        </p:spPr>
+        <p:style>
+          <a:lnRef idx="2">
+            <a:schemeClr val="accent1">
+              <a:shade val="50000"/>
+            </a:schemeClr>
+          </a:lnRef>
+          <a:fillRef idx="1">
+            <a:schemeClr val="accent1"/>
+          </a:fillRef>
+          <a:effectRef idx="0">
+            <a:schemeClr val="accent1"/>
+          </a:effectRef>
+          <a:fontRef idx="minor">
+            <a:schemeClr val="lt1"/>
+          </a:fontRef>
+        </p:style>
+        <p:txBody>
+          <a:bodyPr rtlCol="0" anchor="ctr"/>
+          <a:lstStyle/>
+          <a:p>
+            <a:pPr algn="ctr"/>
+            <a:endParaRPr lang="it-IT" smtClean="0">
+              <a:solidFill>
+                <a:prstClr val="white"/>
+              </a:solidFill>
+            </a:endParaRPr>
+          </a:p>
+        </p:txBody>
+      </p:sp>
+      <p:sp>
+        <p:nvSpPr>
+          <p:cNvPr id="13" name="Rectangle 12"/>
+          <p:cNvSpPr/>
+          <p:nvPr/>
+        </p:nvSpPr>
+        <p:spPr>
+          <a:xfrm>
+            <a:off x="5548746" y="862445"/>
+            <a:ext cx="1656000" cy="1641600"/>
+          </a:xfrm>
+          <a:prstGeom prst="rect">
+            <a:avLst/>
+          </a:prstGeom>
+          <a:solidFill>
+            <a:schemeClr val="accent2">
+              <a:lumMod val="60000"/>
+              <a:lumOff val="40000"/>
+            </a:schemeClr>
+          </a:solidFill>
+          <a:ln>
+            <a:solidFill>
+              <a:schemeClr val="accent2">
+                <a:lumMod val="60000"/>
+                <a:lumOff val="40000"/>
+              </a:schemeClr>
+            </a:solidFill>
+          </a:ln>
+        </p:spPr>
+        <p:style>
+          <a:lnRef idx="2">
+            <a:schemeClr val="accent1">
+              <a:shade val="50000"/>
+            </a:schemeClr>
+          </a:lnRef>
+          <a:fillRef idx="1">
+            <a:schemeClr val="accent1"/>
+          </a:fillRef>
+          <a:effectRef idx="0">
+            <a:schemeClr val="accent1"/>
+          </a:effectRef>
+          <a:fontRef idx="minor">
+            <a:schemeClr val="lt1"/>
+          </a:fontRef>
+        </p:style>
+        <p:txBody>
+          <a:bodyPr rtlCol="0" anchor="ctr"/>
+          <a:lstStyle/>
+          <a:p>
+            <a:pPr algn="ctr"/>
+            <a:endParaRPr lang="it-IT" smtClean="0">
+              <a:solidFill>
+                <a:prstClr val="white"/>
+              </a:solidFill>
+            </a:endParaRPr>
+          </a:p>
+        </p:txBody>
+      </p:sp>
+      <p:sp>
+        <p:nvSpPr>
+          <p:cNvPr id="14" name="Rectangle 13"/>
+          <p:cNvSpPr/>
+          <p:nvPr/>
+        </p:nvSpPr>
+        <p:spPr>
+          <a:xfrm>
+            <a:off x="5548746" y="2760600"/>
+            <a:ext cx="1656000" cy="1641600"/>
+          </a:xfrm>
+          <a:prstGeom prst="rect">
+            <a:avLst/>
+          </a:prstGeom>
+          <a:solidFill>
+            <a:schemeClr val="accent2">
+              <a:lumMod val="60000"/>
+              <a:lumOff val="40000"/>
+            </a:schemeClr>
+          </a:solidFill>
+          <a:ln>
+            <a:solidFill>
+              <a:schemeClr val="accent2">
+                <a:lumMod val="60000"/>
+                <a:lumOff val="40000"/>
+              </a:schemeClr>
+            </a:solidFill>
+          </a:ln>
+        </p:spPr>
+        <p:style>
+          <a:lnRef idx="2">
+            <a:schemeClr val="accent1">
+              <a:shade val="50000"/>
+            </a:schemeClr>
+          </a:lnRef>
+          <a:fillRef idx="1">
+            <a:schemeClr val="accent1"/>
+          </a:fillRef>
+          <a:effectRef idx="0">
+            <a:schemeClr val="accent1"/>
+          </a:effectRef>
+          <a:fontRef idx="minor">
+            <a:schemeClr val="lt1"/>
+          </a:fontRef>
+        </p:style>
+        <p:txBody>
+          <a:bodyPr rtlCol="0" anchor="ctr"/>
+          <a:lstStyle/>
+          <a:p>
+            <a:pPr algn="ctr"/>
+            <a:endParaRPr lang="it-IT" smtClean="0">
+              <a:solidFill>
+                <a:prstClr val="white"/>
+              </a:solidFill>
+            </a:endParaRPr>
+          </a:p>
+        </p:txBody>
+      </p:sp>
+      <p:sp>
+        <p:nvSpPr>
+          <p:cNvPr id="15" name="Rectangle 14"/>
+          <p:cNvSpPr/>
+          <p:nvPr/>
+        </p:nvSpPr>
+        <p:spPr>
+          <a:xfrm>
+            <a:off x="5550668" y="4658428"/>
+            <a:ext cx="1656000" cy="1641600"/>
+          </a:xfrm>
+          <a:prstGeom prst="rect">
+            <a:avLst/>
+          </a:prstGeom>
+          <a:solidFill>
+            <a:schemeClr val="accent2">
+              <a:lumMod val="60000"/>
+              <a:lumOff val="40000"/>
+            </a:schemeClr>
+          </a:solidFill>
+          <a:ln>
+            <a:solidFill>
+              <a:schemeClr val="accent2">
+                <a:lumMod val="60000"/>
+                <a:lumOff val="40000"/>
+              </a:schemeClr>
+            </a:solidFill>
+          </a:ln>
+        </p:spPr>
+        <p:style>
+          <a:lnRef idx="2">
+            <a:schemeClr val="accent1">
+              <a:shade val="50000"/>
+            </a:schemeClr>
+          </a:lnRef>
+          <a:fillRef idx="1">
+            <a:schemeClr val="accent1"/>
+          </a:fillRef>
+          <a:effectRef idx="0">
+            <a:schemeClr val="accent1"/>
+          </a:effectRef>
+          <a:fontRef idx="minor">
+            <a:schemeClr val="lt1"/>
+          </a:fontRef>
+        </p:style>
+        <p:txBody>
+          <a:bodyPr rtlCol="0" anchor="ctr"/>
+          <a:lstStyle/>
+          <a:p>
+            <a:pPr algn="ctr"/>
+            <a:endParaRPr lang="it-IT" smtClean="0">
+              <a:solidFill>
+                <a:prstClr val="white"/>
+              </a:solidFill>
+            </a:endParaRPr>
+          </a:p>
+        </p:txBody>
+      </p:sp>
+      <p:sp>
+        <p:nvSpPr>
+          <p:cNvPr id="16" name="TextBox 15"/>
+          <p:cNvSpPr txBox="1"/>
+          <p:nvPr/>
+        </p:nvSpPr>
+        <p:spPr>
+          <a:xfrm>
+            <a:off x="5883145" y="1309351"/>
+            <a:ext cx="1007007" cy="1015663"/>
+          </a:xfrm>
+          <a:prstGeom prst="rect">
+            <a:avLst/>
+          </a:prstGeom>
+          <a:noFill/>
+        </p:spPr>
+        <p:txBody>
+          <a:bodyPr wrap="none" rtlCol="0">
+            <a:spAutoFit/>
+          </a:bodyPr>
+          <a:lstStyle/>
+          <a:p>
+            <a:r>
+              <a:rPr lang="it-IT" sz="6000" dirty="0" smtClean="0">
+                <a:solidFill>
+                  <a:prstClr val="black"/>
+                </a:solidFill>
+                <a:latin typeface="Montserrat" panose="02000505000000020004" pitchFamily="2" charset="0"/>
+              </a:rPr>
+              <a:t>10</a:t>
+            </a:r>
+          </a:p>
+        </p:txBody>
+      </p:sp>
+      <p:sp>
+        <p:nvSpPr>
+          <p:cNvPr id="17" name="TextBox 16"/>
+          <p:cNvSpPr txBox="1"/>
+          <p:nvPr/>
+        </p:nvSpPr>
+        <p:spPr>
+          <a:xfrm>
+            <a:off x="5891160" y="1041476"/>
+            <a:ext cx="990977" cy="584775"/>
+          </a:xfrm>
+          <a:prstGeom prst="rect">
+            <a:avLst/>
+          </a:prstGeom>
+          <a:noFill/>
+        </p:spPr>
+        <p:txBody>
+          <a:bodyPr wrap="none" rtlCol="0">
+            <a:spAutoFit/>
+          </a:bodyPr>
+          <a:lstStyle/>
+          <a:p>
+            <a:r>
+              <a:rPr lang="it-IT" sz="3200" dirty="0" smtClean="0">
+                <a:solidFill>
+                  <a:prstClr val="black"/>
+                </a:solidFill>
+                <a:latin typeface="Montserrat" panose="02000505000000020004" pitchFamily="2" charset="0"/>
+              </a:rPr>
+              <a:t>FEB</a:t>
+            </a:r>
+          </a:p>
+        </p:txBody>
+      </p:sp>
+      <p:sp>
+        <p:nvSpPr>
+          <p:cNvPr id="21" name="TextBox 20"/>
+          <p:cNvSpPr txBox="1"/>
+          <p:nvPr/>
+        </p:nvSpPr>
+        <p:spPr>
+          <a:xfrm>
+            <a:off x="6076307" y="3199377"/>
+            <a:ext cx="620683" cy="1015663"/>
+          </a:xfrm>
+          <a:prstGeom prst="rect">
+            <a:avLst/>
+          </a:prstGeom>
+          <a:noFill/>
+        </p:spPr>
+        <p:txBody>
+          <a:bodyPr wrap="none" rtlCol="0">
+            <a:spAutoFit/>
+          </a:bodyPr>
+          <a:lstStyle/>
+          <a:p>
+            <a:r>
+              <a:rPr lang="it-IT" sz="6000" dirty="0" smtClean="0">
+                <a:solidFill>
+                  <a:prstClr val="black"/>
+                </a:solidFill>
+                <a:latin typeface="Montserrat" panose="02000505000000020004" pitchFamily="2" charset="0"/>
+              </a:rPr>
+              <a:t>7</a:t>
+            </a:r>
+          </a:p>
+        </p:txBody>
+      </p:sp>
+      <p:sp>
+        <p:nvSpPr>
+          <p:cNvPr id="22" name="TextBox 21"/>
+          <p:cNvSpPr txBox="1"/>
+          <p:nvPr/>
+        </p:nvSpPr>
+        <p:spPr>
+          <a:xfrm>
+            <a:off x="5851886" y="2931502"/>
+            <a:ext cx="1069524" cy="584775"/>
+          </a:xfrm>
+          <a:prstGeom prst="rect">
+            <a:avLst/>
+          </a:prstGeom>
+          <a:noFill/>
+        </p:spPr>
+        <p:txBody>
+          <a:bodyPr wrap="none" rtlCol="0">
+            <a:spAutoFit/>
+          </a:bodyPr>
+          <a:lstStyle/>
+          <a:p>
+            <a:r>
+              <a:rPr lang="it-IT" sz="3200" dirty="0" smtClean="0">
+                <a:solidFill>
+                  <a:prstClr val="black"/>
+                </a:solidFill>
+                <a:latin typeface="Montserrat" panose="02000505000000020004" pitchFamily="2" charset="0"/>
+              </a:rPr>
+              <a:t>JUN</a:t>
+            </a:r>
+          </a:p>
+        </p:txBody>
+      </p:sp>
+      <p:sp>
+        <p:nvSpPr>
+          <p:cNvPr id="23" name="TextBox 22"/>
+          <p:cNvSpPr txBox="1"/>
+          <p:nvPr/>
+        </p:nvSpPr>
+        <p:spPr>
+          <a:xfrm>
+            <a:off x="5920816" y="5142115"/>
+            <a:ext cx="931665" cy="1015663"/>
+          </a:xfrm>
+          <a:prstGeom prst="rect">
+            <a:avLst/>
+          </a:prstGeom>
+          <a:noFill/>
+        </p:spPr>
+        <p:txBody>
+          <a:bodyPr wrap="none" rtlCol="0">
+            <a:spAutoFit/>
+          </a:bodyPr>
+          <a:lstStyle/>
+          <a:p>
+            <a:r>
+              <a:rPr lang="it-IT" sz="6000" dirty="0" smtClean="0">
+                <a:solidFill>
+                  <a:prstClr val="black"/>
+                </a:solidFill>
+                <a:latin typeface="Montserrat" panose="02000505000000020004" pitchFamily="2" charset="0"/>
+              </a:rPr>
+              <a:t>12</a:t>
+            </a:r>
+          </a:p>
+        </p:txBody>
+      </p:sp>
+      <p:sp>
+        <p:nvSpPr>
+          <p:cNvPr id="24" name="TextBox 23"/>
+          <p:cNvSpPr txBox="1"/>
+          <p:nvPr/>
+        </p:nvSpPr>
+        <p:spPr>
+          <a:xfrm>
+            <a:off x="5790972" y="4874240"/>
+            <a:ext cx="1191352" cy="584775"/>
+          </a:xfrm>
+          <a:prstGeom prst="rect">
+            <a:avLst/>
+          </a:prstGeom>
+          <a:noFill/>
+        </p:spPr>
+        <p:txBody>
+          <a:bodyPr wrap="none" rtlCol="0">
+            <a:spAutoFit/>
+          </a:bodyPr>
+          <a:lstStyle/>
+          <a:p>
+            <a:r>
+              <a:rPr lang="it-IT" sz="3200" dirty="0" smtClean="0">
+                <a:solidFill>
+                  <a:prstClr val="black"/>
+                </a:solidFill>
+                <a:latin typeface="Montserrat" panose="02000505000000020004" pitchFamily="2" charset="0"/>
+              </a:rPr>
+              <a:t>MAR</a:t>
+            </a:r>
+          </a:p>
+        </p:txBody>
+      </p:sp>
+      <p:pic>
+        <p:nvPicPr>
+          <p:cNvPr id="29" name="Picture 28"/>
+          <p:cNvPicPr>
+            <a:picLocks noChangeAspect="1"/>
+          </p:cNvPicPr>
+          <p:nvPr/>
+        </p:nvPicPr>
+        <p:blipFill rotWithShape="1">
+          <a:blip r:embed="rId3"/>
+          <a:srcRect b="82287"/>
+          <a:stretch/>
+        </p:blipFill>
+        <p:spPr>
+          <a:xfrm>
+            <a:off x="5485779" y="6515677"/>
+            <a:ext cx="6370872" cy="342323"/>
+          </a:xfrm>
+          <a:prstGeom prst="rect">
+            <a:avLst/>
+          </a:prstGeom>
+        </p:spPr>
+      </p:pic>
+      <p:sp>
+        <p:nvSpPr>
+          <p:cNvPr id="30" name="TextBox 29"/>
+          <p:cNvSpPr txBox="1"/>
+          <p:nvPr/>
+        </p:nvSpPr>
+        <p:spPr>
+          <a:xfrm>
+            <a:off x="5334719" y="246449"/>
+            <a:ext cx="1435008" cy="369332"/>
+          </a:xfrm>
+          <a:prstGeom prst="rect">
+            <a:avLst/>
+          </a:prstGeom>
+          <a:noFill/>
+        </p:spPr>
+        <p:txBody>
+          <a:bodyPr wrap="none" rtlCol="0">
+            <a:spAutoFit/>
+          </a:bodyPr>
+          <a:lstStyle/>
+          <a:p>
+            <a:r>
+              <a:rPr lang="it-IT" dirty="0" smtClean="0">
+                <a:solidFill>
+                  <a:prstClr val="black"/>
+                </a:solidFill>
+                <a:latin typeface="Montserrat" panose="02000505000000020004" pitchFamily="2" charset="0"/>
+              </a:rPr>
+              <a:t>SITENAME</a:t>
+            </a:r>
+          </a:p>
+        </p:txBody>
+      </p:sp>
+      <p:sp>
+        <p:nvSpPr>
+          <p:cNvPr id="31" name="TextBox 30"/>
+          <p:cNvSpPr txBox="1"/>
+          <p:nvPr/>
+        </p:nvSpPr>
+        <p:spPr>
+          <a:xfrm>
+            <a:off x="6943132" y="246449"/>
+            <a:ext cx="941283" cy="369332"/>
+          </a:xfrm>
+          <a:prstGeom prst="rect">
+            <a:avLst/>
+          </a:prstGeom>
+          <a:noFill/>
+        </p:spPr>
+        <p:txBody>
+          <a:bodyPr wrap="none" rtlCol="0">
+            <a:spAutoFit/>
+          </a:bodyPr>
+          <a:lstStyle/>
+          <a:p>
+            <a:r>
+              <a:rPr lang="it-IT" dirty="0" smtClean="0">
+                <a:solidFill>
+                  <a:prstClr val="black"/>
+                </a:solidFill>
+                <a:latin typeface="Montserrat" panose="02000505000000020004" pitchFamily="2" charset="0"/>
+              </a:rPr>
+              <a:t>Menu1</a:t>
+            </a:r>
+          </a:p>
+        </p:txBody>
+      </p:sp>
+      <p:sp>
+        <p:nvSpPr>
+          <p:cNvPr id="32" name="TextBox 31"/>
+          <p:cNvSpPr txBox="1"/>
+          <p:nvPr/>
+        </p:nvSpPr>
+        <p:spPr>
+          <a:xfrm>
+            <a:off x="8057821" y="246449"/>
+            <a:ext cx="989373" cy="369332"/>
+          </a:xfrm>
+          <a:prstGeom prst="rect">
+            <a:avLst/>
+          </a:prstGeom>
+          <a:noFill/>
+        </p:spPr>
+        <p:txBody>
+          <a:bodyPr wrap="none" rtlCol="0">
+            <a:spAutoFit/>
+          </a:bodyPr>
+          <a:lstStyle/>
+          <a:p>
+            <a:r>
+              <a:rPr lang="it-IT" dirty="0" smtClean="0">
+                <a:solidFill>
+                  <a:prstClr val="black"/>
+                </a:solidFill>
+                <a:latin typeface="Montserrat" panose="02000505000000020004" pitchFamily="2" charset="0"/>
+              </a:rPr>
+              <a:t>Menu2</a:t>
+            </a:r>
+          </a:p>
+        </p:txBody>
+      </p:sp>
+      <p:sp>
+        <p:nvSpPr>
+          <p:cNvPr id="36" name="Rounded Rectangle 35"/>
+          <p:cNvSpPr/>
+          <p:nvPr/>
+        </p:nvSpPr>
+        <p:spPr>
+          <a:xfrm>
+            <a:off x="9195955" y="192425"/>
+            <a:ext cx="2597728" cy="464920"/>
+          </a:xfrm>
+          <a:prstGeom prst="roundRect">
+            <a:avLst/>
+          </a:prstGeom>
+          <a:solidFill>
+            <a:schemeClr val="bg1"/>
+          </a:solidFill>
+          <a:ln>
+            <a:solidFill>
+              <a:schemeClr val="bg1">
+                <a:lumMod val="75000"/>
+              </a:schemeClr>
+            </a:solidFill>
+          </a:ln>
+        </p:spPr>
+        <p:style>
+          <a:lnRef idx="2">
+            <a:schemeClr val="accent1">
+              <a:shade val="50000"/>
+            </a:schemeClr>
+          </a:lnRef>
+          <a:fillRef idx="1">
+            <a:schemeClr val="accent1"/>
+          </a:fillRef>
+          <a:effectRef idx="0">
+            <a:schemeClr val="accent1"/>
+          </a:effectRef>
+          <a:fontRef idx="minor">
+            <a:schemeClr val="lt1"/>
+          </a:fontRef>
+        </p:style>
+        <p:txBody>
+          <a:bodyPr rtlCol="0" anchor="ctr"/>
+          <a:lstStyle/>
+          <a:p>
+            <a:pPr algn="ctr"/>
+            <a:endParaRPr lang="it-IT" smtClean="0">
+              <a:solidFill>
+                <a:prstClr val="white"/>
+              </a:solidFill>
+            </a:endParaRPr>
+          </a:p>
+        </p:txBody>
+      </p:sp>
+      <p:pic>
+        <p:nvPicPr>
+          <p:cNvPr id="37" name="Picture 36"/>
+          <p:cNvPicPr>
+            <a:picLocks noChangeAspect="1"/>
+          </p:cNvPicPr>
+          <p:nvPr/>
+        </p:nvPicPr>
+        <p:blipFill>
+          <a:blip r:embed="rId4">
+            <a:lum bright="70000" contrast="-70000"/>
+          </a:blip>
+          <a:stretch>
+            <a:fillRect/>
+          </a:stretch>
+        </p:blipFill>
+        <p:spPr>
+          <a:xfrm flipH="1">
+            <a:off x="11471852" y="320646"/>
+            <a:ext cx="210958" cy="219455"/>
+          </a:xfrm>
+          <a:prstGeom prst="rect">
+            <a:avLst/>
+          </a:prstGeom>
+        </p:spPr>
+      </p:pic>
+    </p:spTree>
+    <p:extLst>
+      <p:ext uri="{BB962C8B-B14F-4D97-AF65-F5344CB8AC3E}">
+        <p14:creationId xmlns:p14="http://schemas.microsoft.com/office/powerpoint/2010/main" val="3403799313"/>
+      </p:ext>
+    </p:extLst>
+  </p:cSld>
+  <p:clrMapOvr>
+    <a:masterClrMapping/>
+  </p:clrMapOvr>
+  <p:timing>
+    <p:tnLst>
+      <p:par>
+        <p:cTn id="1" dur="indefinite" restart="never" nodeType="tmRoot"/>
+      </p:par>
+    </p:tnLst>
+  </p:timing>
 </p:sld>
 </file>
 
@@ -3856,4 +8029,265 @@
     </a:ext>
   </a:extLst>
 </a:theme>
+</file>
+
+<file path=ppt/theme/theme2.xml><?xml version="1.0" encoding="utf-8"?>
+<a:theme xmlns:a="http://schemas.openxmlformats.org/drawingml/2006/main" name="1_Office Theme">
+  <a:themeElements>
+    <a:clrScheme name="Office">
+      <a:dk1>
+        <a:sysClr val="windowText" lastClr="000000"/>
+      </a:dk1>
+      <a:lt1>
+        <a:sysClr val="window" lastClr="FFFFFF"/>
+      </a:lt1>
+      <a:dk2>
+        <a:srgbClr val="44546A"/>
+      </a:dk2>
+      <a:lt2>
+        <a:srgbClr val="E7E6E6"/>
+      </a:lt2>
+      <a:accent1>
+        <a:srgbClr val="5B9BD5"/>
+      </a:accent1>
+      <a:accent2>
+        <a:srgbClr val="ED7D31"/>
+      </a:accent2>
+      <a:accent3>
+        <a:srgbClr val="A5A5A5"/>
+      </a:accent3>
+      <a:accent4>
+        <a:srgbClr val="FFC000"/>
+      </a:accent4>
+      <a:accent5>
+        <a:srgbClr val="4472C4"/>
+      </a:accent5>
+      <a:accent6>
+        <a:srgbClr val="70AD47"/>
+      </a:accent6>
+      <a:hlink>
+        <a:srgbClr val="0563C1"/>
+      </a:hlink>
+      <a:folHlink>
+        <a:srgbClr val="954F72"/>
+      </a:folHlink>
+    </a:clrScheme>
+    <a:fontScheme name="Office">
+      <a:majorFont>
+        <a:latin typeface="Calibri Light" panose="020F0302020204030204"/>
+        <a:ea typeface=""/>
+        <a:cs typeface=""/>
+        <a:font script="Jpan" typeface="ＭＳ Ｐゴシック"/>
+        <a:font script="Hang" typeface="맑은 고딕"/>
+        <a:font script="Hans" typeface="宋体"/>
+        <a:font script="Hant" typeface="新細明體"/>
+        <a:font script="Arab" typeface="Times New Roman"/>
+        <a:font script="Hebr" typeface="Times New Roman"/>
+        <a:font script="Thai" typeface="Angsana New"/>
+        <a:font script="Ethi" typeface="Nyala"/>
+        <a:font script="Beng" typeface="Vrinda"/>
+        <a:font script="Gujr" typeface="Shruti"/>
+        <a:font script="Khmr" typeface="MoolBoran"/>
+        <a:font script="Knda" typeface="Tunga"/>
+        <a:font script="Guru" typeface="Raavi"/>
+        <a:font script="Cans" typeface="Euphemia"/>
+        <a:font script="Cher" typeface="Plantagenet Cherokee"/>
+        <a:font script="Yiii" typeface="Microsoft Yi Baiti"/>
+        <a:font script="Tibt" typeface="Microsoft Himalaya"/>
+        <a:font script="Thaa" typeface="MV Boli"/>
+        <a:font script="Deva" typeface="Mangal"/>
+        <a:font script="Telu" typeface="Gautami"/>
+        <a:font script="Taml" typeface="Latha"/>
+        <a:font script="Syrc" typeface="Estrangelo Edessa"/>
+        <a:font script="Orya" typeface="Kalinga"/>
+        <a:font script="Mlym" typeface="Kartika"/>
+        <a:font script="Laoo" typeface="DokChampa"/>
+        <a:font script="Sinh" typeface="Iskoola Pota"/>
+        <a:font script="Mong" typeface="Mongolian Baiti"/>
+        <a:font script="Viet" typeface="Times New Roman"/>
+        <a:font script="Uigh" typeface="Microsoft Uighur"/>
+        <a:font script="Geor" typeface="Sylfaen"/>
+      </a:majorFont>
+      <a:minorFont>
+        <a:latin typeface="Calibri" panose="020F0502020204030204"/>
+        <a:ea typeface=""/>
+        <a:cs typeface=""/>
+        <a:font script="Jpan" typeface="ＭＳ Ｐゴシック"/>
+        <a:font script="Hang" typeface="맑은 고딕"/>
+        <a:font script="Hans" typeface="宋体"/>
+        <a:font script="Hant" typeface="新細明體"/>
+        <a:font script="Arab" typeface="Arial"/>
+        <a:font script="Hebr" typeface="Arial"/>
+        <a:font script="Thai" typeface="Cordia New"/>
+        <a:font script="Ethi" typeface="Nyala"/>
+        <a:font script="Beng" typeface="Vrinda"/>
+        <a:font script="Gujr" typeface="Shruti"/>
+        <a:font script="Khmr" typeface="DaunPenh"/>
+        <a:font script="Knda" typeface="Tunga"/>
+        <a:font script="Guru" typeface="Raavi"/>
+        <a:font script="Cans" typeface="Euphemia"/>
+        <a:font script="Cher" typeface="Plantagenet Cherokee"/>
+        <a:font script="Yiii" typeface="Microsoft Yi Baiti"/>
+        <a:font script="Tibt" typeface="Microsoft Himalaya"/>
+        <a:font script="Thaa" typeface="MV Boli"/>
+        <a:font script="Deva" typeface="Mangal"/>
+        <a:font script="Telu" typeface="Gautami"/>
+        <a:font script="Taml" typeface="Latha"/>
+        <a:font script="Syrc" typeface="Estrangelo Edessa"/>
+        <a:font script="Orya" typeface="Kalinga"/>
+        <a:font script="Mlym" typeface="Kartika"/>
+        <a:font script="Laoo" typeface="DokChampa"/>
+        <a:font script="Sinh" typeface="Iskoola Pota"/>
+        <a:font script="Mong" typeface="Mongolian Baiti"/>
+        <a:font script="Viet" typeface="Arial"/>
+        <a:font script="Uigh" typeface="Microsoft Uighur"/>
+        <a:font script="Geor" typeface="Sylfaen"/>
+      </a:minorFont>
+    </a:fontScheme>
+    <a:fmtScheme name="Office">
+      <a:fillStyleLst>
+        <a:solidFill>
+          <a:schemeClr val="phClr"/>
+        </a:solidFill>
+        <a:gradFill rotWithShape="1">
+          <a:gsLst>
+            <a:gs pos="0">
+              <a:schemeClr val="phClr">
+                <a:lumMod val="110000"/>
+                <a:satMod val="105000"/>
+                <a:tint val="67000"/>
+              </a:schemeClr>
+            </a:gs>
+            <a:gs pos="50000">
+              <a:schemeClr val="phClr">
+                <a:lumMod val="105000"/>
+                <a:satMod val="103000"/>
+                <a:tint val="73000"/>
+              </a:schemeClr>
+            </a:gs>
+            <a:gs pos="100000">
+              <a:schemeClr val="phClr">
+                <a:lumMod val="105000"/>
+                <a:satMod val="109000"/>
+                <a:tint val="81000"/>
+              </a:schemeClr>
+            </a:gs>
+          </a:gsLst>
+          <a:lin ang="5400000" scaled="0"/>
+        </a:gradFill>
+        <a:gradFill rotWithShape="1">
+          <a:gsLst>
+            <a:gs pos="0">
+              <a:schemeClr val="phClr">
+                <a:satMod val="103000"/>
+                <a:lumMod val="102000"/>
+                <a:tint val="94000"/>
+              </a:schemeClr>
+            </a:gs>
+            <a:gs pos="50000">
+              <a:schemeClr val="phClr">
+                <a:satMod val="110000"/>
+                <a:lumMod val="100000"/>
+                <a:shade val="100000"/>
+              </a:schemeClr>
+            </a:gs>
+            <a:gs pos="100000">
+              <a:schemeClr val="phClr">
+                <a:lumMod val="99000"/>
+                <a:satMod val="120000"/>
+                <a:shade val="78000"/>
+              </a:schemeClr>
+            </a:gs>
+          </a:gsLst>
+          <a:lin ang="5400000" scaled="0"/>
+        </a:gradFill>
+      </a:fillStyleLst>
+      <a:lnStyleLst>
+        <a:ln w="6350" cap="flat" cmpd="sng" algn="ctr">
+          <a:solidFill>
+            <a:schemeClr val="phClr"/>
+          </a:solidFill>
+          <a:prstDash val="solid"/>
+          <a:miter lim="800000"/>
+        </a:ln>
+        <a:ln w="12700" cap="flat" cmpd="sng" algn="ctr">
+          <a:solidFill>
+            <a:schemeClr val="phClr"/>
+          </a:solidFill>
+          <a:prstDash val="solid"/>
+          <a:miter lim="800000"/>
+        </a:ln>
+        <a:ln w="19050" cap="flat" cmpd="sng" algn="ctr">
+          <a:solidFill>
+            <a:schemeClr val="phClr"/>
+          </a:solidFill>
+          <a:prstDash val="solid"/>
+          <a:miter lim="800000"/>
+        </a:ln>
+      </a:lnStyleLst>
+      <a:effectStyleLst>
+        <a:effectStyle>
+          <a:effectLst/>
+        </a:effectStyle>
+        <a:effectStyle>
+          <a:effectLst/>
+        </a:effectStyle>
+        <a:effectStyle>
+          <a:effectLst>
+            <a:outerShdw blurRad="57150" dist="19050" dir="5400000" algn="ctr" rotWithShape="0">
+              <a:srgbClr val="000000">
+                <a:alpha val="63000"/>
+              </a:srgbClr>
+            </a:outerShdw>
+          </a:effectLst>
+        </a:effectStyle>
+      </a:effectStyleLst>
+      <a:bgFillStyleLst>
+        <a:solidFill>
+          <a:schemeClr val="phClr"/>
+        </a:solidFill>
+        <a:solidFill>
+          <a:schemeClr val="phClr">
+            <a:tint val="95000"/>
+            <a:satMod val="170000"/>
+          </a:schemeClr>
+        </a:solidFill>
+        <a:gradFill rotWithShape="1">
+          <a:gsLst>
+            <a:gs pos="0">
+              <a:schemeClr val="phClr">
+                <a:tint val="93000"/>
+                <a:satMod val="150000"/>
+                <a:shade val="98000"/>
+                <a:lumMod val="102000"/>
+              </a:schemeClr>
+            </a:gs>
+            <a:gs pos="50000">
+              <a:schemeClr val="phClr">
+                <a:tint val="98000"/>
+                <a:satMod val="130000"/>
+                <a:shade val="90000"/>
+                <a:lumMod val="103000"/>
+              </a:schemeClr>
+            </a:gs>
+            <a:gs pos="100000">
+              <a:schemeClr val="phClr">
+                <a:shade val="63000"/>
+                <a:satMod val="120000"/>
+              </a:schemeClr>
+            </a:gs>
+          </a:gsLst>
+          <a:lin ang="5400000" scaled="0"/>
+        </a:gradFill>
+      </a:bgFillStyleLst>
+    </a:fmtScheme>
+  </a:themeElements>
+  <a:objectDefaults/>
+  <a:extraClrSchemeLst/>
+  <a:extLst>
+    <a:ext uri="{05A4C25C-085E-4340-85A3-A5531E510DB2}">
+      <thm15:themeFamily xmlns:thm15="http://schemas.microsoft.com/office/thememl/2012/main" name="Office Theme" id="{62F939B6-93AF-4DB8-9C6B-D6C7DFDC589F}" vid="{4A3C46E8-61CC-4603-A589-7422A47A8E4A}"/>
+    </a:ext>
+  </a:extLst>
+</a:theme>
 </file>
</xml_diff>